<commit_message>
finished presentation sldies and Capstone 1 Project Presentation.ipynb
</commit_message>
<xml_diff>
--- a/Capstone 1 Project Presentation.pptx
+++ b/Capstone 1 Project Presentation.pptx
@@ -4,11 +4,22 @@
   <p:sldMasterIdLst>
     <p:sldMasterId id="2147483775" r:id="rId1"/>
   </p:sldMasterIdLst>
+  <p:notesMasterIdLst>
+    <p:notesMasterId r:id="rId14"/>
+  </p:notesMasterIdLst>
   <p:sldIdLst>
     <p:sldId id="256" r:id="rId2"/>
     <p:sldId id="257" r:id="rId3"/>
-    <p:sldId id="259" r:id="rId4"/>
-    <p:sldId id="260" r:id="rId5"/>
+    <p:sldId id="264" r:id="rId4"/>
+    <p:sldId id="265" r:id="rId5"/>
+    <p:sldId id="266" r:id="rId6"/>
+    <p:sldId id="267" r:id="rId7"/>
+    <p:sldId id="262" r:id="rId8"/>
+    <p:sldId id="259" r:id="rId9"/>
+    <p:sldId id="263" r:id="rId10"/>
+    <p:sldId id="261" r:id="rId11"/>
+    <p:sldId id="268" r:id="rId12"/>
+    <p:sldId id="260" r:id="rId13"/>
   </p:sldIdLst>
   <p:sldSz cx="12192000" cy="6858000"/>
   <p:notesSz cx="6858000" cy="9144000"/>
@@ -107,12 +118,18 @@
       </a:defRPr>
     </a:lvl9pPr>
   </p:defaultTextStyle>
+  <p:extLst>
+    <p:ext uri="{EFAFB233-063F-42B5-8137-9DF3F51BA10A}">
+      <p15:sldGuideLst xmlns:p15="http://schemas.microsoft.com/office/powerpoint/2012/main"/>
+    </p:ext>
+  </p:extLst>
 </p:presentation>
 </file>
 
 <file path=ppt/revisionInfo.xml><?xml version="1.0" encoding="utf-8"?>
 <p1510:revInfo xmlns:a="http://schemas.openxmlformats.org/drawingml/2006/main" xmlns:r="http://schemas.openxmlformats.org/officeDocument/2006/relationships" xmlns:p1510="http://schemas.microsoft.com/office/powerpoint/2015/10/main">
   <p1510:revLst>
+    <p1510:client id="{47A3E9A2-1DEB-406B-939E-765C1733DED8}" v="17" dt="2021-07-31T22:27:30.973"/>
     <p1510:client id="{C2647F16-45E8-4DCE-97F6-6E347E49CD5A}" v="81" dt="2021-07-31T14:13:27.666"/>
   </p1510:revLst>
 </p1510:revInfo>
@@ -120,6 +137,439 @@
 
 <file path=ppt/changesInfos/changesInfo1.xml><?xml version="1.0" encoding="utf-8"?>
 <pc:chgInfo xmlns:a="http://schemas.openxmlformats.org/drawingml/2006/main" xmlns:r="http://schemas.openxmlformats.org/officeDocument/2006/relationships" xmlns:ac="http://schemas.microsoft.com/office/drawing/2013/main/command" xmlns:pc="http://schemas.microsoft.com/office/powerpoint/2013/main/command">
+  <pc:docChgLst>
+    <pc:chgData name="John Clos" userId="35f71590851144db" providerId="LiveId" clId="{47A3E9A2-1DEB-406B-939E-765C1733DED8}"/>
+    <pc:docChg chg="undo custSel addSld delSld modSld sldOrd">
+      <pc:chgData name="John Clos" userId="35f71590851144db" providerId="LiveId" clId="{47A3E9A2-1DEB-406B-939E-765C1733DED8}" dt="2021-07-31T22:41:36.370" v="2295" actId="20577"/>
+      <pc:docMkLst>
+        <pc:docMk/>
+      </pc:docMkLst>
+      <pc:sldChg chg="modSp mod">
+        <pc:chgData name="John Clos" userId="35f71590851144db" providerId="LiveId" clId="{47A3E9A2-1DEB-406B-939E-765C1733DED8}" dt="2021-07-31T18:33:47.760" v="204" actId="20577"/>
+        <pc:sldMkLst>
+          <pc:docMk/>
+          <pc:sldMk cId="3540748988" sldId="256"/>
+        </pc:sldMkLst>
+        <pc:spChg chg="mod">
+          <ac:chgData name="John Clos" userId="35f71590851144db" providerId="LiveId" clId="{47A3E9A2-1DEB-406B-939E-765C1733DED8}" dt="2021-07-31T18:33:47.760" v="204" actId="20577"/>
+          <ac:spMkLst>
+            <pc:docMk/>
+            <pc:sldMk cId="3540748988" sldId="256"/>
+            <ac:spMk id="3" creationId="{03722126-C15E-4293-BC4F-236E3A90A3BC}"/>
+          </ac:spMkLst>
+        </pc:spChg>
+      </pc:sldChg>
+      <pc:sldChg chg="modSp">
+        <pc:chgData name="John Clos" userId="35f71590851144db" providerId="LiveId" clId="{47A3E9A2-1DEB-406B-939E-765C1733DED8}" dt="2021-07-31T18:24:35.937" v="200" actId="1076"/>
+        <pc:sldMkLst>
+          <pc:docMk/>
+          <pc:sldMk cId="2020304455" sldId="257"/>
+        </pc:sldMkLst>
+        <pc:picChg chg="mod">
+          <ac:chgData name="John Clos" userId="35f71590851144db" providerId="LiveId" clId="{47A3E9A2-1DEB-406B-939E-765C1733DED8}" dt="2021-07-31T18:24:35.937" v="200" actId="1076"/>
+          <ac:picMkLst>
+            <pc:docMk/>
+            <pc:sldMk cId="2020304455" sldId="257"/>
+            <ac:picMk id="1026" creationId="{C7D3BB0B-66DB-4EB3-AB57-B1DB92764823}"/>
+          </ac:picMkLst>
+        </pc:picChg>
+        <pc:picChg chg="mod">
+          <ac:chgData name="John Clos" userId="35f71590851144db" providerId="LiveId" clId="{47A3E9A2-1DEB-406B-939E-765C1733DED8}" dt="2021-07-31T18:24:32.175" v="199" actId="1076"/>
+          <ac:picMkLst>
+            <pc:docMk/>
+            <pc:sldMk cId="2020304455" sldId="257"/>
+            <ac:picMk id="1028" creationId="{6FD683C1-221F-4BC8-B381-88D77D056D0A}"/>
+          </ac:picMkLst>
+        </pc:picChg>
+      </pc:sldChg>
+      <pc:sldChg chg="delSp modSp del mod">
+        <pc:chgData name="John Clos" userId="35f71590851144db" providerId="LiveId" clId="{47A3E9A2-1DEB-406B-939E-765C1733DED8}" dt="2021-07-31T18:16:55.763" v="153" actId="2696"/>
+        <pc:sldMkLst>
+          <pc:docMk/>
+          <pc:sldMk cId="1599298110" sldId="259"/>
+        </pc:sldMkLst>
+        <pc:spChg chg="mod">
+          <ac:chgData name="John Clos" userId="35f71590851144db" providerId="LiveId" clId="{47A3E9A2-1DEB-406B-939E-765C1733DED8}" dt="2021-07-31T17:55:30.574" v="5" actId="1076"/>
+          <ac:spMkLst>
+            <pc:docMk/>
+            <pc:sldMk cId="1599298110" sldId="259"/>
+            <ac:spMk id="2" creationId="{6C0944A9-93FA-43EF-A3DB-9DEE6F35CE4A}"/>
+          </ac:spMkLst>
+        </pc:spChg>
+        <pc:picChg chg="del">
+          <ac:chgData name="John Clos" userId="35f71590851144db" providerId="LiveId" clId="{47A3E9A2-1DEB-406B-939E-765C1733DED8}" dt="2021-07-31T18:01:41.741" v="140" actId="478"/>
+          <ac:picMkLst>
+            <pc:docMk/>
+            <pc:sldMk cId="1599298110" sldId="259"/>
+            <ac:picMk id="7" creationId="{48E86971-C331-47D2-9203-90A56B25C057}"/>
+          </ac:picMkLst>
+        </pc:picChg>
+      </pc:sldChg>
+      <pc:sldChg chg="addSp modSp add mod modNotesTx">
+        <pc:chgData name="John Clos" userId="35f71590851144db" providerId="LiveId" clId="{47A3E9A2-1DEB-406B-939E-765C1733DED8}" dt="2021-07-31T22:36:00.411" v="1540" actId="20577"/>
+        <pc:sldMkLst>
+          <pc:docMk/>
+          <pc:sldMk cId="2150094559" sldId="259"/>
+        </pc:sldMkLst>
+        <pc:spChg chg="mod">
+          <ac:chgData name="John Clos" userId="35f71590851144db" providerId="LiveId" clId="{47A3E9A2-1DEB-406B-939E-765C1733DED8}" dt="2021-07-31T18:48:09.879" v="322" actId="20577"/>
+          <ac:spMkLst>
+            <pc:docMk/>
+            <pc:sldMk cId="2150094559" sldId="259"/>
+            <ac:spMk id="2" creationId="{6C0944A9-93FA-43EF-A3DB-9DEE6F35CE4A}"/>
+          </ac:spMkLst>
+        </pc:spChg>
+        <pc:picChg chg="add mod">
+          <ac:chgData name="John Clos" userId="35f71590851144db" providerId="LiveId" clId="{47A3E9A2-1DEB-406B-939E-765C1733DED8}" dt="2021-07-31T18:36:31.904" v="211" actId="14100"/>
+          <ac:picMkLst>
+            <pc:docMk/>
+            <pc:sldMk cId="2150094559" sldId="259"/>
+            <ac:picMk id="4" creationId="{07FE90DC-3277-4C30-949E-80A408939F35}"/>
+          </ac:picMkLst>
+        </pc:picChg>
+      </pc:sldChg>
+      <pc:sldChg chg="modSp">
+        <pc:chgData name="John Clos" userId="35f71590851144db" providerId="LiveId" clId="{47A3E9A2-1DEB-406B-939E-765C1733DED8}" dt="2021-07-31T22:27:30.973" v="538" actId="20577"/>
+        <pc:sldMkLst>
+          <pc:docMk/>
+          <pc:sldMk cId="1379012888" sldId="260"/>
+        </pc:sldMkLst>
+        <pc:spChg chg="mod">
+          <ac:chgData name="John Clos" userId="35f71590851144db" providerId="LiveId" clId="{47A3E9A2-1DEB-406B-939E-765C1733DED8}" dt="2021-07-31T22:27:30.973" v="538" actId="20577"/>
+          <ac:spMkLst>
+            <pc:docMk/>
+            <pc:sldMk cId="1379012888" sldId="260"/>
+            <ac:spMk id="3" creationId="{20E07A58-743A-422E-8ADA-B2D70560B545}"/>
+          </ac:spMkLst>
+        </pc:spChg>
+        <pc:picChg chg="mod">
+          <ac:chgData name="John Clos" userId="35f71590851144db" providerId="LiveId" clId="{47A3E9A2-1DEB-406B-939E-765C1733DED8}" dt="2021-07-31T18:24:24.870" v="198" actId="1076"/>
+          <ac:picMkLst>
+            <pc:docMk/>
+            <pc:sldMk cId="1379012888" sldId="260"/>
+            <ac:picMk id="1026" creationId="{C7D3BB0B-66DB-4EB3-AB57-B1DB92764823}"/>
+          </ac:picMkLst>
+        </pc:picChg>
+        <pc:picChg chg="mod">
+          <ac:chgData name="John Clos" userId="35f71590851144db" providerId="LiveId" clId="{47A3E9A2-1DEB-406B-939E-765C1733DED8}" dt="2021-07-31T18:23:42.246" v="195" actId="1076"/>
+          <ac:picMkLst>
+            <pc:docMk/>
+            <pc:sldMk cId="1379012888" sldId="260"/>
+            <ac:picMk id="1028" creationId="{6FD683C1-221F-4BC8-B381-88D77D056D0A}"/>
+          </ac:picMkLst>
+        </pc:picChg>
+      </pc:sldChg>
+      <pc:sldChg chg="delSp add del mod ord">
+        <pc:chgData name="John Clos" userId="35f71590851144db" providerId="LiveId" clId="{47A3E9A2-1DEB-406B-939E-765C1733DED8}" dt="2021-07-31T18:16:55.763" v="153" actId="2696"/>
+        <pc:sldMkLst>
+          <pc:docMk/>
+          <pc:sldMk cId="1676407100" sldId="261"/>
+        </pc:sldMkLst>
+        <pc:picChg chg="del">
+          <ac:chgData name="John Clos" userId="35f71590851144db" providerId="LiveId" clId="{47A3E9A2-1DEB-406B-939E-765C1733DED8}" dt="2021-07-31T18:01:31.906" v="137" actId="478"/>
+          <ac:picMkLst>
+            <pc:docMk/>
+            <pc:sldMk cId="1676407100" sldId="261"/>
+            <ac:picMk id="7" creationId="{48E86971-C331-47D2-9203-90A56B25C057}"/>
+          </ac:picMkLst>
+        </pc:picChg>
+      </pc:sldChg>
+      <pc:sldChg chg="addSp delSp modSp add mod modNotesTx">
+        <pc:chgData name="John Clos" userId="35f71590851144db" providerId="LiveId" clId="{47A3E9A2-1DEB-406B-939E-765C1733DED8}" dt="2021-07-31T22:38:50.065" v="1829" actId="20577"/>
+        <pc:sldMkLst>
+          <pc:docMk/>
+          <pc:sldMk cId="2807429900" sldId="261"/>
+        </pc:sldMkLst>
+        <pc:spChg chg="mod">
+          <ac:chgData name="John Clos" userId="35f71590851144db" providerId="LiveId" clId="{47A3E9A2-1DEB-406B-939E-765C1733DED8}" dt="2021-07-31T18:47:24.099" v="287" actId="6549"/>
+          <ac:spMkLst>
+            <pc:docMk/>
+            <pc:sldMk cId="2807429900" sldId="261"/>
+            <ac:spMk id="2" creationId="{6C0944A9-93FA-43EF-A3DB-9DEE6F35CE4A}"/>
+          </ac:spMkLst>
+        </pc:spChg>
+        <pc:picChg chg="add del mod">
+          <ac:chgData name="John Clos" userId="35f71590851144db" providerId="LiveId" clId="{47A3E9A2-1DEB-406B-939E-765C1733DED8}" dt="2021-07-31T18:37:40.197" v="221" actId="478"/>
+          <ac:picMkLst>
+            <pc:docMk/>
+            <pc:sldMk cId="2807429900" sldId="261"/>
+            <ac:picMk id="4" creationId="{46E9BF2D-EE04-47D1-A6F6-F1D699515465}"/>
+          </ac:picMkLst>
+        </pc:picChg>
+        <pc:picChg chg="add mod">
+          <ac:chgData name="John Clos" userId="35f71590851144db" providerId="LiveId" clId="{47A3E9A2-1DEB-406B-939E-765C1733DED8}" dt="2021-07-31T18:46:09.167" v="234" actId="962"/>
+          <ac:picMkLst>
+            <pc:docMk/>
+            <pc:sldMk cId="2807429900" sldId="261"/>
+            <ac:picMk id="6" creationId="{EDF232AF-E2B0-440C-B040-3E2AD9CF8F03}"/>
+          </ac:picMkLst>
+        </pc:picChg>
+      </pc:sldChg>
+      <pc:sldChg chg="delSp add del mod">
+        <pc:chgData name="John Clos" userId="35f71590851144db" providerId="LiveId" clId="{47A3E9A2-1DEB-406B-939E-765C1733DED8}" dt="2021-07-31T18:16:55.763" v="153" actId="2696"/>
+        <pc:sldMkLst>
+          <pc:docMk/>
+          <pc:sldMk cId="173543021" sldId="262"/>
+        </pc:sldMkLst>
+        <pc:picChg chg="del">
+          <ac:chgData name="John Clos" userId="35f71590851144db" providerId="LiveId" clId="{47A3E9A2-1DEB-406B-939E-765C1733DED8}" dt="2021-07-31T18:01:38.683" v="139" actId="478"/>
+          <ac:picMkLst>
+            <pc:docMk/>
+            <pc:sldMk cId="173543021" sldId="262"/>
+            <ac:picMk id="7" creationId="{48E86971-C331-47D2-9203-90A56B25C057}"/>
+          </ac:picMkLst>
+        </pc:picChg>
+      </pc:sldChg>
+      <pc:sldChg chg="addSp modSp add mod ord modNotesTx">
+        <pc:chgData name="John Clos" userId="35f71590851144db" providerId="LiveId" clId="{47A3E9A2-1DEB-406B-939E-765C1733DED8}" dt="2021-07-31T22:35:41.867" v="1500" actId="20577"/>
+        <pc:sldMkLst>
+          <pc:docMk/>
+          <pc:sldMk cId="2997993616" sldId="262"/>
+        </pc:sldMkLst>
+        <pc:spChg chg="mod">
+          <ac:chgData name="John Clos" userId="35f71590851144db" providerId="LiveId" clId="{47A3E9A2-1DEB-406B-939E-765C1733DED8}" dt="2021-07-31T18:48:41.106" v="400" actId="20577"/>
+          <ac:spMkLst>
+            <pc:docMk/>
+            <pc:sldMk cId="2997993616" sldId="262"/>
+            <ac:spMk id="2" creationId="{6C0944A9-93FA-43EF-A3DB-9DEE6F35CE4A}"/>
+          </ac:spMkLst>
+        </pc:spChg>
+        <pc:picChg chg="add mod">
+          <ac:chgData name="John Clos" userId="35f71590851144db" providerId="LiveId" clId="{47A3E9A2-1DEB-406B-939E-765C1733DED8}" dt="2021-07-31T18:21:27.005" v="189" actId="14100"/>
+          <ac:picMkLst>
+            <pc:docMk/>
+            <pc:sldMk cId="2997993616" sldId="262"/>
+            <ac:picMk id="4" creationId="{1A4831F6-5B1E-440C-8FDB-53588348E3CB}"/>
+          </ac:picMkLst>
+        </pc:picChg>
+        <pc:picChg chg="add mod">
+          <ac:chgData name="John Clos" userId="35f71590851144db" providerId="LiveId" clId="{47A3E9A2-1DEB-406B-939E-765C1733DED8}" dt="2021-07-31T18:21:23.185" v="188" actId="14100"/>
+          <ac:picMkLst>
+            <pc:docMk/>
+            <pc:sldMk cId="2997993616" sldId="262"/>
+            <ac:picMk id="6" creationId="{E9335B6B-74B9-439F-8E70-E0EE8E4058C3}"/>
+          </ac:picMkLst>
+        </pc:picChg>
+      </pc:sldChg>
+      <pc:sldChg chg="addSp delSp modSp add mod modNotesTx">
+        <pc:chgData name="John Clos" userId="35f71590851144db" providerId="LiveId" clId="{47A3E9A2-1DEB-406B-939E-765C1733DED8}" dt="2021-07-31T22:38:12.334" v="1746" actId="20577"/>
+        <pc:sldMkLst>
+          <pc:docMk/>
+          <pc:sldMk cId="1330968395" sldId="263"/>
+        </pc:sldMkLst>
+        <pc:spChg chg="mod">
+          <ac:chgData name="John Clos" userId="35f71590851144db" providerId="LiveId" clId="{47A3E9A2-1DEB-406B-939E-765C1733DED8}" dt="2021-07-31T22:28:50.523" v="582" actId="20577"/>
+          <ac:spMkLst>
+            <pc:docMk/>
+            <pc:sldMk cId="1330968395" sldId="263"/>
+            <ac:spMk id="2" creationId="{6C0944A9-93FA-43EF-A3DB-9DEE6F35CE4A}"/>
+          </ac:spMkLst>
+        </pc:spChg>
+        <pc:picChg chg="add del mod">
+          <ac:chgData name="John Clos" userId="35f71590851144db" providerId="LiveId" clId="{47A3E9A2-1DEB-406B-939E-765C1733DED8}" dt="2021-07-31T18:37:18.544" v="216" actId="478"/>
+          <ac:picMkLst>
+            <pc:docMk/>
+            <pc:sldMk cId="1330968395" sldId="263"/>
+            <ac:picMk id="4" creationId="{22C6E7FA-A4C6-4FCB-8865-A6A42797ED43}"/>
+          </ac:picMkLst>
+        </pc:picChg>
+        <pc:picChg chg="add del mod">
+          <ac:chgData name="John Clos" userId="35f71590851144db" providerId="LiveId" clId="{47A3E9A2-1DEB-406B-939E-765C1733DED8}" dt="2021-07-31T18:45:55.262" v="226" actId="478"/>
+          <ac:picMkLst>
+            <pc:docMk/>
+            <pc:sldMk cId="1330968395" sldId="263"/>
+            <ac:picMk id="6" creationId="{2131A6D5-049C-4B72-8D85-113AE9B1C0F1}"/>
+          </ac:picMkLst>
+        </pc:picChg>
+        <pc:picChg chg="add mod">
+          <ac:chgData name="John Clos" userId="35f71590851144db" providerId="LiveId" clId="{47A3E9A2-1DEB-406B-939E-765C1733DED8}" dt="2021-07-31T18:46:02.118" v="230" actId="962"/>
+          <ac:picMkLst>
+            <pc:docMk/>
+            <pc:sldMk cId="1330968395" sldId="263"/>
+            <ac:picMk id="8" creationId="{2F33DE95-5DBA-4804-88BD-5462F8321CC8}"/>
+          </ac:picMkLst>
+        </pc:picChg>
+      </pc:sldChg>
+      <pc:sldChg chg="delSp add del mod">
+        <pc:chgData name="John Clos" userId="35f71590851144db" providerId="LiveId" clId="{47A3E9A2-1DEB-406B-939E-765C1733DED8}" dt="2021-07-31T18:16:55.763" v="153" actId="2696"/>
+        <pc:sldMkLst>
+          <pc:docMk/>
+          <pc:sldMk cId="2347314469" sldId="263"/>
+        </pc:sldMkLst>
+        <pc:picChg chg="del">
+          <ac:chgData name="John Clos" userId="35f71590851144db" providerId="LiveId" clId="{47A3E9A2-1DEB-406B-939E-765C1733DED8}" dt="2021-07-31T18:01:34.955" v="138" actId="478"/>
+          <ac:picMkLst>
+            <pc:docMk/>
+            <pc:sldMk cId="2347314469" sldId="263"/>
+            <ac:picMk id="7" creationId="{48E86971-C331-47D2-9203-90A56B25C057}"/>
+          </ac:picMkLst>
+        </pc:picChg>
+      </pc:sldChg>
+      <pc:sldChg chg="addSp delSp modSp add mod modNotesTx">
+        <pc:chgData name="John Clos" userId="35f71590851144db" providerId="LiveId" clId="{47A3E9A2-1DEB-406B-939E-765C1733DED8}" dt="2021-07-31T22:29:24.458" v="633" actId="20577"/>
+        <pc:sldMkLst>
+          <pc:docMk/>
+          <pc:sldMk cId="1616280574" sldId="264"/>
+        </pc:sldMkLst>
+        <pc:spChg chg="mod">
+          <ac:chgData name="John Clos" userId="35f71590851144db" providerId="LiveId" clId="{47A3E9A2-1DEB-406B-939E-765C1733DED8}" dt="2021-07-31T18:48:57.110" v="431" actId="20577"/>
+          <ac:spMkLst>
+            <pc:docMk/>
+            <pc:sldMk cId="1616280574" sldId="264"/>
+            <ac:spMk id="2" creationId="{6C0944A9-93FA-43EF-A3DB-9DEE6F35CE4A}"/>
+          </ac:spMkLst>
+        </pc:spChg>
+        <pc:picChg chg="add del mod">
+          <ac:chgData name="John Clos" userId="35f71590851144db" providerId="LiveId" clId="{47A3E9A2-1DEB-406B-939E-765C1733DED8}" dt="2021-07-31T22:13:16.664" v="464" actId="478"/>
+          <ac:picMkLst>
+            <pc:docMk/>
+            <pc:sldMk cId="1616280574" sldId="264"/>
+            <ac:picMk id="4" creationId="{1BD5308C-E710-4E94-A412-EC9B6ED7E583}"/>
+          </ac:picMkLst>
+        </pc:picChg>
+        <pc:picChg chg="add mod">
+          <ac:chgData name="John Clos" userId="35f71590851144db" providerId="LiveId" clId="{47A3E9A2-1DEB-406B-939E-765C1733DED8}" dt="2021-07-31T22:22:33.558" v="520" actId="1076"/>
+          <ac:picMkLst>
+            <pc:docMk/>
+            <pc:sldMk cId="1616280574" sldId="264"/>
+            <ac:picMk id="5" creationId="{AD8FD5FA-75FB-4AC3-9665-342104008B33}"/>
+          </ac:picMkLst>
+        </pc:picChg>
+        <pc:picChg chg="del">
+          <ac:chgData name="John Clos" userId="35f71590851144db" providerId="LiveId" clId="{47A3E9A2-1DEB-406B-939E-765C1733DED8}" dt="2021-07-31T17:57:52.608" v="123" actId="478"/>
+          <ac:picMkLst>
+            <pc:docMk/>
+            <pc:sldMk cId="1616280574" sldId="264"/>
+            <ac:picMk id="7" creationId="{48E86971-C331-47D2-9203-90A56B25C057}"/>
+          </ac:picMkLst>
+        </pc:picChg>
+      </pc:sldChg>
+      <pc:sldChg chg="addSp delSp modSp add mod modNotesTx">
+        <pc:chgData name="John Clos" userId="35f71590851144db" providerId="LiveId" clId="{47A3E9A2-1DEB-406B-939E-765C1733DED8}" dt="2021-07-31T22:30:44.789" v="904" actId="20577"/>
+        <pc:sldMkLst>
+          <pc:docMk/>
+          <pc:sldMk cId="3838220639" sldId="265"/>
+        </pc:sldMkLst>
+        <pc:spChg chg="mod">
+          <ac:chgData name="John Clos" userId="35f71590851144db" providerId="LiveId" clId="{47A3E9A2-1DEB-406B-939E-765C1733DED8}" dt="2021-07-31T22:23:36.549" v="531" actId="20577"/>
+          <ac:spMkLst>
+            <pc:docMk/>
+            <pc:sldMk cId="3838220639" sldId="265"/>
+            <ac:spMk id="2" creationId="{6C0944A9-93FA-43EF-A3DB-9DEE6F35CE4A}"/>
+          </ac:spMkLst>
+        </pc:spChg>
+        <pc:picChg chg="add del mod">
+          <ac:chgData name="John Clos" userId="35f71590851144db" providerId="LiveId" clId="{47A3E9A2-1DEB-406B-939E-765C1733DED8}" dt="2021-07-31T22:14:46.245" v="468" actId="478"/>
+          <ac:picMkLst>
+            <pc:docMk/>
+            <pc:sldMk cId="3838220639" sldId="265"/>
+            <ac:picMk id="4" creationId="{E24947F7-1893-44B9-BA5C-EA61D8E22686}"/>
+          </ac:picMkLst>
+        </pc:picChg>
+        <pc:picChg chg="add mod modCrop">
+          <ac:chgData name="John Clos" userId="35f71590851144db" providerId="LiveId" clId="{47A3E9A2-1DEB-406B-939E-765C1733DED8}" dt="2021-07-31T22:22:03.178" v="516" actId="1076"/>
+          <ac:picMkLst>
+            <pc:docMk/>
+            <pc:sldMk cId="3838220639" sldId="265"/>
+            <ac:picMk id="5" creationId="{0F025E06-4770-4D59-98AB-DC2ACA9AA1DB}"/>
+          </ac:picMkLst>
+        </pc:picChg>
+        <pc:picChg chg="del">
+          <ac:chgData name="John Clos" userId="35f71590851144db" providerId="LiveId" clId="{47A3E9A2-1DEB-406B-939E-765C1733DED8}" dt="2021-07-31T17:57:14.330" v="86" actId="478"/>
+          <ac:picMkLst>
+            <pc:docMk/>
+            <pc:sldMk cId="3838220639" sldId="265"/>
+            <ac:picMk id="7" creationId="{48E86971-C331-47D2-9203-90A56B25C057}"/>
+          </ac:picMkLst>
+        </pc:picChg>
+      </pc:sldChg>
+      <pc:sldChg chg="addSp delSp modSp add mod modNotesTx">
+        <pc:chgData name="John Clos" userId="35f71590851144db" providerId="LiveId" clId="{47A3E9A2-1DEB-406B-939E-765C1733DED8}" dt="2021-07-31T22:31:30.327" v="1019" actId="20577"/>
+        <pc:sldMkLst>
+          <pc:docMk/>
+          <pc:sldMk cId="718411913" sldId="266"/>
+        </pc:sldMkLst>
+        <pc:spChg chg="mod">
+          <ac:chgData name="John Clos" userId="35f71590851144db" providerId="LiveId" clId="{47A3E9A2-1DEB-406B-939E-765C1733DED8}" dt="2021-07-31T22:23:24.170" v="526" actId="20577"/>
+          <ac:spMkLst>
+            <pc:docMk/>
+            <pc:sldMk cId="718411913" sldId="266"/>
+            <ac:spMk id="2" creationId="{6C0944A9-93FA-43EF-A3DB-9DEE6F35CE4A}"/>
+          </ac:spMkLst>
+        </pc:spChg>
+        <pc:picChg chg="add mod modCrop">
+          <ac:chgData name="John Clos" userId="35f71590851144db" providerId="LiveId" clId="{47A3E9A2-1DEB-406B-939E-765C1733DED8}" dt="2021-07-31T18:01:10.375" v="134" actId="14100"/>
+          <ac:picMkLst>
+            <pc:docMk/>
+            <pc:sldMk cId="718411913" sldId="266"/>
+            <ac:picMk id="4" creationId="{5C5D309B-02F4-4C12-8C9E-5C12C652B498}"/>
+          </ac:picMkLst>
+        </pc:picChg>
+        <pc:picChg chg="del">
+          <ac:chgData name="John Clos" userId="35f71590851144db" providerId="LiveId" clId="{47A3E9A2-1DEB-406B-939E-765C1733DED8}" dt="2021-07-31T17:57:06.036" v="85" actId="478"/>
+          <ac:picMkLst>
+            <pc:docMk/>
+            <pc:sldMk cId="718411913" sldId="266"/>
+            <ac:picMk id="7" creationId="{48E86971-C331-47D2-9203-90A56B25C057}"/>
+          </ac:picMkLst>
+        </pc:picChg>
+      </pc:sldChg>
+      <pc:sldChg chg="addSp delSp modSp add mod ord modNotesTx">
+        <pc:chgData name="John Clos" userId="35f71590851144db" providerId="LiveId" clId="{47A3E9A2-1DEB-406B-939E-765C1733DED8}" dt="2021-07-31T22:34:54.613" v="1413" actId="20577"/>
+        <pc:sldMkLst>
+          <pc:docMk/>
+          <pc:sldMk cId="841579074" sldId="267"/>
+        </pc:sldMkLst>
+        <pc:spChg chg="mod">
+          <ac:chgData name="John Clos" userId="35f71590851144db" providerId="LiveId" clId="{47A3E9A2-1DEB-406B-939E-765C1733DED8}" dt="2021-07-31T22:17:20.621" v="503" actId="313"/>
+          <ac:spMkLst>
+            <pc:docMk/>
+            <pc:sldMk cId="841579074" sldId="267"/>
+            <ac:spMk id="2" creationId="{6C0944A9-93FA-43EF-A3DB-9DEE6F35CE4A}"/>
+          </ac:spMkLst>
+        </pc:spChg>
+        <pc:picChg chg="add mod">
+          <ac:chgData name="John Clos" userId="35f71590851144db" providerId="LiveId" clId="{47A3E9A2-1DEB-406B-939E-765C1733DED8}" dt="2021-07-31T22:16:40.235" v="479" actId="14100"/>
+          <ac:picMkLst>
+            <pc:docMk/>
+            <pc:sldMk cId="841579074" sldId="267"/>
+            <ac:picMk id="4" creationId="{03120CF2-A29B-4A4F-A7ED-E7018CFE409E}"/>
+          </ac:picMkLst>
+        </pc:picChg>
+        <pc:picChg chg="del mod">
+          <ac:chgData name="John Clos" userId="35f71590851144db" providerId="LiveId" clId="{47A3E9A2-1DEB-406B-939E-765C1733DED8}" dt="2021-07-31T22:15:25.596" v="474" actId="478"/>
+          <ac:picMkLst>
+            <pc:docMk/>
+            <pc:sldMk cId="841579074" sldId="267"/>
+            <ac:picMk id="7" creationId="{48E86971-C331-47D2-9203-90A56B25C057}"/>
+          </ac:picMkLst>
+        </pc:picChg>
+      </pc:sldChg>
+      <pc:sldChg chg="addSp delSp modSp add mod modNotesTx">
+        <pc:chgData name="John Clos" userId="35f71590851144db" providerId="LiveId" clId="{47A3E9A2-1DEB-406B-939E-765C1733DED8}" dt="2021-07-31T22:41:36.370" v="2295" actId="20577"/>
+        <pc:sldMkLst>
+          <pc:docMk/>
+          <pc:sldMk cId="1597181047" sldId="268"/>
+        </pc:sldMkLst>
+        <pc:picChg chg="del">
+          <ac:chgData name="John Clos" userId="35f71590851144db" providerId="LiveId" clId="{47A3E9A2-1DEB-406B-939E-765C1733DED8}" dt="2021-07-31T22:16:51.375" v="481" actId="478"/>
+          <ac:picMkLst>
+            <pc:docMk/>
+            <pc:sldMk cId="1597181047" sldId="268"/>
+            <ac:picMk id="4" creationId="{03120CF2-A29B-4A4F-A7ED-E7018CFE409E}"/>
+          </ac:picMkLst>
+        </pc:picChg>
+        <pc:picChg chg="add mod">
+          <ac:chgData name="John Clos" userId="35f71590851144db" providerId="LiveId" clId="{47A3E9A2-1DEB-406B-939E-765C1733DED8}" dt="2021-07-31T22:20:19.365" v="513" actId="1076"/>
+          <ac:picMkLst>
+            <pc:docMk/>
+            <pc:sldMk cId="1597181047" sldId="268"/>
+            <ac:picMk id="5" creationId="{B8830913-28E2-47F8-A241-E188A2ED7143}"/>
+          </ac:picMkLst>
+        </pc:picChg>
+      </pc:sldChg>
+    </pc:docChg>
+  </pc:docChgLst>
   <pc:docChgLst>
     <pc:chgData name="John Clos" userId="35f71590851144db" providerId="LiveId" clId="{C2647F16-45E8-4DCE-97F6-6E347E49CD5A}"/>
     <pc:docChg chg="custSel addSld delSld modSld sldOrd">
@@ -307,6 +757,1152 @@
     </pc:docChg>
   </pc:docChgLst>
 </pc:chgInfo>
+</file>
+
+<file path=ppt/notesMasters/notesMaster1.xml><?xml version="1.0" encoding="utf-8"?>
+<p:notesMaster xmlns:a="http://schemas.openxmlformats.org/drawingml/2006/main" xmlns:r="http://schemas.openxmlformats.org/officeDocument/2006/relationships" xmlns:p="http://schemas.openxmlformats.org/presentationml/2006/main">
+  <p:cSld>
+    <p:bg>
+      <p:bgRef idx="1001">
+        <a:schemeClr val="bg1"/>
+      </p:bgRef>
+    </p:bg>
+    <p:spTree>
+      <p:nvGrpSpPr>
+        <p:cNvPr id="1" name=""/>
+        <p:cNvGrpSpPr/>
+        <p:nvPr/>
+      </p:nvGrpSpPr>
+      <p:grpSpPr>
+        <a:xfrm>
+          <a:off x="0" y="0"/>
+          <a:ext cx="0" cy="0"/>
+          <a:chOff x="0" y="0"/>
+          <a:chExt cx="0" cy="0"/>
+        </a:xfrm>
+      </p:grpSpPr>
+      <p:sp>
+        <p:nvSpPr>
+          <p:cNvPr id="2" name="Header Placeholder 1"/>
+          <p:cNvSpPr>
+            <a:spLocks noGrp="1"/>
+          </p:cNvSpPr>
+          <p:nvPr>
+            <p:ph type="hdr" sz="quarter"/>
+          </p:nvPr>
+        </p:nvSpPr>
+        <p:spPr>
+          <a:xfrm>
+            <a:off x="0" y="0"/>
+            <a:ext cx="2971800" cy="458788"/>
+          </a:xfrm>
+          <a:prstGeom prst="rect">
+            <a:avLst/>
+          </a:prstGeom>
+        </p:spPr>
+        <p:txBody>
+          <a:bodyPr vert="horz" lIns="91440" tIns="45720" rIns="91440" bIns="45720" rtlCol="0"/>
+          <a:lstStyle>
+            <a:lvl1pPr algn="l">
+              <a:defRPr sz="1200"/>
+            </a:lvl1pPr>
+          </a:lstStyle>
+          <a:p>
+            <a:endParaRPr lang="en-US"/>
+          </a:p>
+        </p:txBody>
+      </p:sp>
+      <p:sp>
+        <p:nvSpPr>
+          <p:cNvPr id="3" name="Date Placeholder 2"/>
+          <p:cNvSpPr>
+            <a:spLocks noGrp="1"/>
+          </p:cNvSpPr>
+          <p:nvPr>
+            <p:ph type="dt" idx="1"/>
+          </p:nvPr>
+        </p:nvSpPr>
+        <p:spPr>
+          <a:xfrm>
+            <a:off x="3884613" y="0"/>
+            <a:ext cx="2971800" cy="458788"/>
+          </a:xfrm>
+          <a:prstGeom prst="rect">
+            <a:avLst/>
+          </a:prstGeom>
+        </p:spPr>
+        <p:txBody>
+          <a:bodyPr vert="horz" lIns="91440" tIns="45720" rIns="91440" bIns="45720" rtlCol="0"/>
+          <a:lstStyle>
+            <a:lvl1pPr algn="r">
+              <a:defRPr sz="1200"/>
+            </a:lvl1pPr>
+          </a:lstStyle>
+          <a:p>
+            <a:fld id="{8DA4B5C8-7F76-411B-B7AA-050361CC3933}" type="datetimeFigureOut">
+              <a:rPr lang="en-US" smtClean="0"/>
+              <a:t>7/31/2021</a:t>
+            </a:fld>
+            <a:endParaRPr lang="en-US"/>
+          </a:p>
+        </p:txBody>
+      </p:sp>
+      <p:sp>
+        <p:nvSpPr>
+          <p:cNvPr id="4" name="Slide Image Placeholder 3"/>
+          <p:cNvSpPr>
+            <a:spLocks noGrp="1" noRot="1" noChangeAspect="1"/>
+          </p:cNvSpPr>
+          <p:nvPr>
+            <p:ph type="sldImg" idx="2"/>
+          </p:nvPr>
+        </p:nvSpPr>
+        <p:spPr>
+          <a:xfrm>
+            <a:off x="685800" y="1143000"/>
+            <a:ext cx="5486400" cy="3086100"/>
+          </a:xfrm>
+          <a:prstGeom prst="rect">
+            <a:avLst/>
+          </a:prstGeom>
+          <a:noFill/>
+          <a:ln w="12700">
+            <a:solidFill>
+              <a:prstClr val="black"/>
+            </a:solidFill>
+          </a:ln>
+        </p:spPr>
+        <p:txBody>
+          <a:bodyPr vert="horz" lIns="91440" tIns="45720" rIns="91440" bIns="45720" rtlCol="0" anchor="ctr"/>
+          <a:lstStyle/>
+          <a:p>
+            <a:endParaRPr lang="en-US"/>
+          </a:p>
+        </p:txBody>
+      </p:sp>
+      <p:sp>
+        <p:nvSpPr>
+          <p:cNvPr id="5" name="Notes Placeholder 4"/>
+          <p:cNvSpPr>
+            <a:spLocks noGrp="1"/>
+          </p:cNvSpPr>
+          <p:nvPr>
+            <p:ph type="body" sz="quarter" idx="3"/>
+          </p:nvPr>
+        </p:nvSpPr>
+        <p:spPr>
+          <a:xfrm>
+            <a:off x="685800" y="4400550"/>
+            <a:ext cx="5486400" cy="3600450"/>
+          </a:xfrm>
+          <a:prstGeom prst="rect">
+            <a:avLst/>
+          </a:prstGeom>
+        </p:spPr>
+        <p:txBody>
+          <a:bodyPr vert="horz" lIns="91440" tIns="45720" rIns="91440" bIns="45720" rtlCol="0"/>
+          <a:lstStyle/>
+          <a:p>
+            <a:pPr lvl="0"/>
+            <a:r>
+              <a:rPr lang="en-US"/>
+              <a:t>Click to edit Master text styles</a:t>
+            </a:r>
+          </a:p>
+          <a:p>
+            <a:pPr lvl="1"/>
+            <a:r>
+              <a:rPr lang="en-US"/>
+              <a:t>Second level</a:t>
+            </a:r>
+          </a:p>
+          <a:p>
+            <a:pPr lvl="2"/>
+            <a:r>
+              <a:rPr lang="en-US"/>
+              <a:t>Third level</a:t>
+            </a:r>
+          </a:p>
+          <a:p>
+            <a:pPr lvl="3"/>
+            <a:r>
+              <a:rPr lang="en-US"/>
+              <a:t>Fourth level</a:t>
+            </a:r>
+          </a:p>
+          <a:p>
+            <a:pPr lvl="4"/>
+            <a:r>
+              <a:rPr lang="en-US"/>
+              <a:t>Fifth level</a:t>
+            </a:r>
+          </a:p>
+        </p:txBody>
+      </p:sp>
+      <p:sp>
+        <p:nvSpPr>
+          <p:cNvPr id="6" name="Footer Placeholder 5"/>
+          <p:cNvSpPr>
+            <a:spLocks noGrp="1"/>
+          </p:cNvSpPr>
+          <p:nvPr>
+            <p:ph type="ftr" sz="quarter" idx="4"/>
+          </p:nvPr>
+        </p:nvSpPr>
+        <p:spPr>
+          <a:xfrm>
+            <a:off x="0" y="8685213"/>
+            <a:ext cx="2971800" cy="458787"/>
+          </a:xfrm>
+          <a:prstGeom prst="rect">
+            <a:avLst/>
+          </a:prstGeom>
+        </p:spPr>
+        <p:txBody>
+          <a:bodyPr vert="horz" lIns="91440" tIns="45720" rIns="91440" bIns="45720" rtlCol="0" anchor="b"/>
+          <a:lstStyle>
+            <a:lvl1pPr algn="l">
+              <a:defRPr sz="1200"/>
+            </a:lvl1pPr>
+          </a:lstStyle>
+          <a:p>
+            <a:endParaRPr lang="en-US"/>
+          </a:p>
+        </p:txBody>
+      </p:sp>
+      <p:sp>
+        <p:nvSpPr>
+          <p:cNvPr id="7" name="Slide Number Placeholder 6"/>
+          <p:cNvSpPr>
+            <a:spLocks noGrp="1"/>
+          </p:cNvSpPr>
+          <p:nvPr>
+            <p:ph type="sldNum" sz="quarter" idx="5"/>
+          </p:nvPr>
+        </p:nvSpPr>
+        <p:spPr>
+          <a:xfrm>
+            <a:off x="3884613" y="8685213"/>
+            <a:ext cx="2971800" cy="458787"/>
+          </a:xfrm>
+          <a:prstGeom prst="rect">
+            <a:avLst/>
+          </a:prstGeom>
+        </p:spPr>
+        <p:txBody>
+          <a:bodyPr vert="horz" lIns="91440" tIns="45720" rIns="91440" bIns="45720" rtlCol="0" anchor="b"/>
+          <a:lstStyle>
+            <a:lvl1pPr algn="r">
+              <a:defRPr sz="1200"/>
+            </a:lvl1pPr>
+          </a:lstStyle>
+          <a:p>
+            <a:fld id="{6D1583D5-8638-4A9E-A2AF-359F022BD2AC}" type="slidenum">
+              <a:rPr lang="en-US" smtClean="0"/>
+              <a:t>‹#›</a:t>
+            </a:fld>
+            <a:endParaRPr lang="en-US"/>
+          </a:p>
+        </p:txBody>
+      </p:sp>
+    </p:spTree>
+    <p:extLst>
+      <p:ext uri="{BB962C8B-B14F-4D97-AF65-F5344CB8AC3E}">
+        <p14:creationId xmlns:p14="http://schemas.microsoft.com/office/powerpoint/2010/main" val="972955209"/>
+      </p:ext>
+    </p:extLst>
+  </p:cSld>
+  <p:clrMap bg1="lt1" tx1="dk1" bg2="lt2" tx2="dk2" accent1="accent1" accent2="accent2" accent3="accent3" accent4="accent4" accent5="accent5" accent6="accent6" hlink="hlink" folHlink="folHlink"/>
+  <p:notesStyle>
+    <a:lvl1pPr marL="0" algn="l" defTabSz="914400" rtl="0" eaLnBrk="1" latinLnBrk="0" hangingPunct="1">
+      <a:defRPr sz="1200" kern="1200">
+        <a:solidFill>
+          <a:schemeClr val="tx1"/>
+        </a:solidFill>
+        <a:latin typeface="+mn-lt"/>
+        <a:ea typeface="+mn-ea"/>
+        <a:cs typeface="+mn-cs"/>
+      </a:defRPr>
+    </a:lvl1pPr>
+    <a:lvl2pPr marL="457200" algn="l" defTabSz="914400" rtl="0" eaLnBrk="1" latinLnBrk="0" hangingPunct="1">
+      <a:defRPr sz="1200" kern="1200">
+        <a:solidFill>
+          <a:schemeClr val="tx1"/>
+        </a:solidFill>
+        <a:latin typeface="+mn-lt"/>
+        <a:ea typeface="+mn-ea"/>
+        <a:cs typeface="+mn-cs"/>
+      </a:defRPr>
+    </a:lvl2pPr>
+    <a:lvl3pPr marL="914400" algn="l" defTabSz="914400" rtl="0" eaLnBrk="1" latinLnBrk="0" hangingPunct="1">
+      <a:defRPr sz="1200" kern="1200">
+        <a:solidFill>
+          <a:schemeClr val="tx1"/>
+        </a:solidFill>
+        <a:latin typeface="+mn-lt"/>
+        <a:ea typeface="+mn-ea"/>
+        <a:cs typeface="+mn-cs"/>
+      </a:defRPr>
+    </a:lvl3pPr>
+    <a:lvl4pPr marL="1371600" algn="l" defTabSz="914400" rtl="0" eaLnBrk="1" latinLnBrk="0" hangingPunct="1">
+      <a:defRPr sz="1200" kern="1200">
+        <a:solidFill>
+          <a:schemeClr val="tx1"/>
+        </a:solidFill>
+        <a:latin typeface="+mn-lt"/>
+        <a:ea typeface="+mn-ea"/>
+        <a:cs typeface="+mn-cs"/>
+      </a:defRPr>
+    </a:lvl4pPr>
+    <a:lvl5pPr marL="1828800" algn="l" defTabSz="914400" rtl="0" eaLnBrk="1" latinLnBrk="0" hangingPunct="1">
+      <a:defRPr sz="1200" kern="1200">
+        <a:solidFill>
+          <a:schemeClr val="tx1"/>
+        </a:solidFill>
+        <a:latin typeface="+mn-lt"/>
+        <a:ea typeface="+mn-ea"/>
+        <a:cs typeface="+mn-cs"/>
+      </a:defRPr>
+    </a:lvl5pPr>
+    <a:lvl6pPr marL="2286000" algn="l" defTabSz="914400" rtl="0" eaLnBrk="1" latinLnBrk="0" hangingPunct="1">
+      <a:defRPr sz="1200" kern="1200">
+        <a:solidFill>
+          <a:schemeClr val="tx1"/>
+        </a:solidFill>
+        <a:latin typeface="+mn-lt"/>
+        <a:ea typeface="+mn-ea"/>
+        <a:cs typeface="+mn-cs"/>
+      </a:defRPr>
+    </a:lvl6pPr>
+    <a:lvl7pPr marL="2743200" algn="l" defTabSz="914400" rtl="0" eaLnBrk="1" latinLnBrk="0" hangingPunct="1">
+      <a:defRPr sz="1200" kern="1200">
+        <a:solidFill>
+          <a:schemeClr val="tx1"/>
+        </a:solidFill>
+        <a:latin typeface="+mn-lt"/>
+        <a:ea typeface="+mn-ea"/>
+        <a:cs typeface="+mn-cs"/>
+      </a:defRPr>
+    </a:lvl7pPr>
+    <a:lvl8pPr marL="3200400" algn="l" defTabSz="914400" rtl="0" eaLnBrk="1" latinLnBrk="0" hangingPunct="1">
+      <a:defRPr sz="1200" kern="1200">
+        <a:solidFill>
+          <a:schemeClr val="tx1"/>
+        </a:solidFill>
+        <a:latin typeface="+mn-lt"/>
+        <a:ea typeface="+mn-ea"/>
+        <a:cs typeface="+mn-cs"/>
+      </a:defRPr>
+    </a:lvl8pPr>
+    <a:lvl9pPr marL="3657600" algn="l" defTabSz="914400" rtl="0" eaLnBrk="1" latinLnBrk="0" hangingPunct="1">
+      <a:defRPr sz="1200" kern="1200">
+        <a:solidFill>
+          <a:schemeClr val="tx1"/>
+        </a:solidFill>
+        <a:latin typeface="+mn-lt"/>
+        <a:ea typeface="+mn-ea"/>
+        <a:cs typeface="+mn-cs"/>
+      </a:defRPr>
+    </a:lvl9pPr>
+  </p:notesStyle>
+</p:notesMaster>
+</file>
+
+<file path=ppt/notesSlides/notesSlide1.xml><?xml version="1.0" encoding="utf-8"?>
+<p:notes xmlns:a="http://schemas.openxmlformats.org/drawingml/2006/main" xmlns:r="http://schemas.openxmlformats.org/officeDocument/2006/relationships" xmlns:p="http://schemas.openxmlformats.org/presentationml/2006/main">
+  <p:cSld>
+    <p:spTree>
+      <p:nvGrpSpPr>
+        <p:cNvPr id="1" name=""/>
+        <p:cNvGrpSpPr/>
+        <p:nvPr/>
+      </p:nvGrpSpPr>
+      <p:grpSpPr>
+        <a:xfrm>
+          <a:off x="0" y="0"/>
+          <a:ext cx="0" cy="0"/>
+          <a:chOff x="0" y="0"/>
+          <a:chExt cx="0" cy="0"/>
+        </a:xfrm>
+      </p:grpSpPr>
+      <p:sp>
+        <p:nvSpPr>
+          <p:cNvPr id="2" name="Slide Image Placeholder 1"/>
+          <p:cNvSpPr>
+            <a:spLocks noGrp="1" noRot="1" noChangeAspect="1"/>
+          </p:cNvSpPr>
+          <p:nvPr>
+            <p:ph type="sldImg"/>
+          </p:nvPr>
+        </p:nvSpPr>
+        <p:spPr/>
+      </p:sp>
+      <p:sp>
+        <p:nvSpPr>
+          <p:cNvPr id="3" name="Notes Placeholder 2"/>
+          <p:cNvSpPr>
+            <a:spLocks noGrp="1"/>
+          </p:cNvSpPr>
+          <p:nvPr>
+            <p:ph type="body" idx="1"/>
+          </p:nvPr>
+        </p:nvSpPr>
+        <p:spPr/>
+        <p:txBody>
+          <a:bodyPr/>
+          <a:lstStyle/>
+          <a:p>
+            <a:r>
+              <a:rPr lang="en-US" dirty="0"/>
+              <a:t>The plot of all data doesn’t show us much.</a:t>
+            </a:r>
+          </a:p>
+        </p:txBody>
+      </p:sp>
+      <p:sp>
+        <p:nvSpPr>
+          <p:cNvPr id="4" name="Slide Number Placeholder 3"/>
+          <p:cNvSpPr>
+            <a:spLocks noGrp="1"/>
+          </p:cNvSpPr>
+          <p:nvPr>
+            <p:ph type="sldNum" sz="quarter" idx="5"/>
+          </p:nvPr>
+        </p:nvSpPr>
+        <p:spPr/>
+        <p:txBody>
+          <a:bodyPr/>
+          <a:lstStyle/>
+          <a:p>
+            <a:fld id="{6D1583D5-8638-4A9E-A2AF-359F022BD2AC}" type="slidenum">
+              <a:rPr lang="en-US" smtClean="0"/>
+              <a:t>3</a:t>
+            </a:fld>
+            <a:endParaRPr lang="en-US"/>
+          </a:p>
+        </p:txBody>
+      </p:sp>
+    </p:spTree>
+    <p:extLst>
+      <p:ext uri="{BB962C8B-B14F-4D97-AF65-F5344CB8AC3E}">
+        <p14:creationId xmlns:p14="http://schemas.microsoft.com/office/powerpoint/2010/main" val="2843980947"/>
+      </p:ext>
+    </p:extLst>
+  </p:cSld>
+  <p:clrMapOvr>
+    <a:masterClrMapping/>
+  </p:clrMapOvr>
+</p:notes>
+</file>
+
+<file path=ppt/notesSlides/notesSlide2.xml><?xml version="1.0" encoding="utf-8"?>
+<p:notes xmlns:a="http://schemas.openxmlformats.org/drawingml/2006/main" xmlns:r="http://schemas.openxmlformats.org/officeDocument/2006/relationships" xmlns:p="http://schemas.openxmlformats.org/presentationml/2006/main">
+  <p:cSld>
+    <p:spTree>
+      <p:nvGrpSpPr>
+        <p:cNvPr id="1" name=""/>
+        <p:cNvGrpSpPr/>
+        <p:nvPr/>
+      </p:nvGrpSpPr>
+      <p:grpSpPr>
+        <a:xfrm>
+          <a:off x="0" y="0"/>
+          <a:ext cx="0" cy="0"/>
+          <a:chOff x="0" y="0"/>
+          <a:chExt cx="0" cy="0"/>
+        </a:xfrm>
+      </p:grpSpPr>
+      <p:sp>
+        <p:nvSpPr>
+          <p:cNvPr id="2" name="Slide Image Placeholder 1"/>
+          <p:cNvSpPr>
+            <a:spLocks noGrp="1" noRot="1" noChangeAspect="1"/>
+          </p:cNvSpPr>
+          <p:nvPr>
+            <p:ph type="sldImg"/>
+          </p:nvPr>
+        </p:nvSpPr>
+        <p:spPr/>
+      </p:sp>
+      <p:sp>
+        <p:nvSpPr>
+          <p:cNvPr id="3" name="Notes Placeholder 2"/>
+          <p:cNvSpPr>
+            <a:spLocks noGrp="1"/>
+          </p:cNvSpPr>
+          <p:nvPr>
+            <p:ph type="body" idx="1"/>
+          </p:nvPr>
+        </p:nvSpPr>
+        <p:spPr/>
+        <p:txBody>
+          <a:bodyPr/>
+          <a:lstStyle/>
+          <a:p>
+            <a:r>
+              <a:rPr lang="en-US" dirty="0"/>
+              <a:t>When we just show the data for 2019 though, we can see that the life expectancy is much better for higher education rates except for a small group of data.</a:t>
+            </a:r>
+          </a:p>
+        </p:txBody>
+      </p:sp>
+      <p:sp>
+        <p:nvSpPr>
+          <p:cNvPr id="4" name="Slide Number Placeholder 3"/>
+          <p:cNvSpPr>
+            <a:spLocks noGrp="1"/>
+          </p:cNvSpPr>
+          <p:nvPr>
+            <p:ph type="sldNum" sz="quarter" idx="5"/>
+          </p:nvPr>
+        </p:nvSpPr>
+        <p:spPr/>
+        <p:txBody>
+          <a:bodyPr/>
+          <a:lstStyle/>
+          <a:p>
+            <a:fld id="{6D1583D5-8638-4A9E-A2AF-359F022BD2AC}" type="slidenum">
+              <a:rPr lang="en-US" smtClean="0"/>
+              <a:t>4</a:t>
+            </a:fld>
+            <a:endParaRPr lang="en-US"/>
+          </a:p>
+        </p:txBody>
+      </p:sp>
+    </p:spTree>
+    <p:extLst>
+      <p:ext uri="{BB962C8B-B14F-4D97-AF65-F5344CB8AC3E}">
+        <p14:creationId xmlns:p14="http://schemas.microsoft.com/office/powerpoint/2010/main" val="3721478953"/>
+      </p:ext>
+    </p:extLst>
+  </p:cSld>
+  <p:clrMapOvr>
+    <a:masterClrMapping/>
+  </p:clrMapOvr>
+</p:notes>
+</file>
+
+<file path=ppt/notesSlides/notesSlide3.xml><?xml version="1.0" encoding="utf-8"?>
+<p:notes xmlns:a="http://schemas.openxmlformats.org/drawingml/2006/main" xmlns:r="http://schemas.openxmlformats.org/officeDocument/2006/relationships" xmlns:p="http://schemas.openxmlformats.org/presentationml/2006/main">
+  <p:cSld>
+    <p:spTree>
+      <p:nvGrpSpPr>
+        <p:cNvPr id="1" name=""/>
+        <p:cNvGrpSpPr/>
+        <p:nvPr/>
+      </p:nvGrpSpPr>
+      <p:grpSpPr>
+        <a:xfrm>
+          <a:off x="0" y="0"/>
+          <a:ext cx="0" cy="0"/>
+          <a:chOff x="0" y="0"/>
+          <a:chExt cx="0" cy="0"/>
+        </a:xfrm>
+      </p:grpSpPr>
+      <p:sp>
+        <p:nvSpPr>
+          <p:cNvPr id="2" name="Slide Image Placeholder 1"/>
+          <p:cNvSpPr>
+            <a:spLocks noGrp="1" noRot="1" noChangeAspect="1"/>
+          </p:cNvSpPr>
+          <p:nvPr>
+            <p:ph type="sldImg"/>
+          </p:nvPr>
+        </p:nvSpPr>
+        <p:spPr/>
+      </p:sp>
+      <p:sp>
+        <p:nvSpPr>
+          <p:cNvPr id="3" name="Notes Placeholder 2"/>
+          <p:cNvSpPr>
+            <a:spLocks noGrp="1"/>
+          </p:cNvSpPr>
+          <p:nvPr>
+            <p:ph type="body" idx="1"/>
+          </p:nvPr>
+        </p:nvSpPr>
+        <p:spPr/>
+        <p:txBody>
+          <a:bodyPr/>
+          <a:lstStyle/>
+          <a:p>
+            <a:r>
+              <a:rPr lang="en-US" dirty="0"/>
+              <a:t>So if we filter the data for this range, we see that it is for Lithuania for the </a:t>
+            </a:r>
+            <a:r>
+              <a:rPr lang="en-US" dirty="0" err="1"/>
+              <a:t>the</a:t>
+            </a:r>
+            <a:r>
+              <a:rPr lang="en-US" dirty="0"/>
+              <a:t> younger age ranges.</a:t>
+            </a:r>
+          </a:p>
+        </p:txBody>
+      </p:sp>
+      <p:sp>
+        <p:nvSpPr>
+          <p:cNvPr id="4" name="Slide Number Placeholder 3"/>
+          <p:cNvSpPr>
+            <a:spLocks noGrp="1"/>
+          </p:cNvSpPr>
+          <p:nvPr>
+            <p:ph type="sldNum" sz="quarter" idx="5"/>
+          </p:nvPr>
+        </p:nvSpPr>
+        <p:spPr/>
+        <p:txBody>
+          <a:bodyPr/>
+          <a:lstStyle/>
+          <a:p>
+            <a:fld id="{6D1583D5-8638-4A9E-A2AF-359F022BD2AC}" type="slidenum">
+              <a:rPr lang="en-US" smtClean="0"/>
+              <a:t>5</a:t>
+            </a:fld>
+            <a:endParaRPr lang="en-US"/>
+          </a:p>
+        </p:txBody>
+      </p:sp>
+    </p:spTree>
+    <p:extLst>
+      <p:ext uri="{BB962C8B-B14F-4D97-AF65-F5344CB8AC3E}">
+        <p14:creationId xmlns:p14="http://schemas.microsoft.com/office/powerpoint/2010/main" val="3278223236"/>
+      </p:ext>
+    </p:extLst>
+  </p:cSld>
+  <p:clrMapOvr>
+    <a:masterClrMapping/>
+  </p:clrMapOvr>
+</p:notes>
+</file>
+
+<file path=ppt/notesSlides/notesSlide4.xml><?xml version="1.0" encoding="utf-8"?>
+<p:notes xmlns:a="http://schemas.openxmlformats.org/drawingml/2006/main" xmlns:r="http://schemas.openxmlformats.org/officeDocument/2006/relationships" xmlns:p="http://schemas.openxmlformats.org/presentationml/2006/main">
+  <p:cSld>
+    <p:spTree>
+      <p:nvGrpSpPr>
+        <p:cNvPr id="1" name=""/>
+        <p:cNvGrpSpPr/>
+        <p:nvPr/>
+      </p:nvGrpSpPr>
+      <p:grpSpPr>
+        <a:xfrm>
+          <a:off x="0" y="0"/>
+          <a:ext cx="0" cy="0"/>
+          <a:chOff x="0" y="0"/>
+          <a:chExt cx="0" cy="0"/>
+        </a:xfrm>
+      </p:grpSpPr>
+      <p:sp>
+        <p:nvSpPr>
+          <p:cNvPr id="2" name="Slide Image Placeholder 1"/>
+          <p:cNvSpPr>
+            <a:spLocks noGrp="1" noRot="1" noChangeAspect="1"/>
+          </p:cNvSpPr>
+          <p:nvPr>
+            <p:ph type="sldImg"/>
+          </p:nvPr>
+        </p:nvSpPr>
+        <p:spPr/>
+      </p:sp>
+      <p:sp>
+        <p:nvSpPr>
+          <p:cNvPr id="3" name="Notes Placeholder 2"/>
+          <p:cNvSpPr>
+            <a:spLocks noGrp="1"/>
+          </p:cNvSpPr>
+          <p:nvPr>
+            <p:ph type="body" idx="1"/>
+          </p:nvPr>
+        </p:nvSpPr>
+        <p:spPr/>
+        <p:txBody>
+          <a:bodyPr/>
+          <a:lstStyle/>
+          <a:p>
+            <a:r>
+              <a:rPr lang="en-US" dirty="0"/>
+              <a:t>So if we plot the data for Lithuania by age ranges, we see that the higher education rates are much better at the lower age ranges than the upper ones.</a:t>
+            </a:r>
+          </a:p>
+          <a:p>
+            <a:r>
+              <a:rPr lang="en-US" dirty="0"/>
+              <a:t>Maybe the improvement in education rates have not had a chance to improve the life expectancy for Lithuania.</a:t>
+            </a:r>
+          </a:p>
+        </p:txBody>
+      </p:sp>
+      <p:sp>
+        <p:nvSpPr>
+          <p:cNvPr id="4" name="Slide Number Placeholder 3"/>
+          <p:cNvSpPr>
+            <a:spLocks noGrp="1"/>
+          </p:cNvSpPr>
+          <p:nvPr>
+            <p:ph type="sldNum" sz="quarter" idx="5"/>
+          </p:nvPr>
+        </p:nvSpPr>
+        <p:spPr/>
+        <p:txBody>
+          <a:bodyPr/>
+          <a:lstStyle/>
+          <a:p>
+            <a:fld id="{6D1583D5-8638-4A9E-A2AF-359F022BD2AC}" type="slidenum">
+              <a:rPr lang="en-US" smtClean="0"/>
+              <a:t>6</a:t>
+            </a:fld>
+            <a:endParaRPr lang="en-US"/>
+          </a:p>
+        </p:txBody>
+      </p:sp>
+    </p:spTree>
+    <p:extLst>
+      <p:ext uri="{BB962C8B-B14F-4D97-AF65-F5344CB8AC3E}">
+        <p14:creationId xmlns:p14="http://schemas.microsoft.com/office/powerpoint/2010/main" val="2266248613"/>
+      </p:ext>
+    </p:extLst>
+  </p:cSld>
+  <p:clrMapOvr>
+    <a:masterClrMapping/>
+  </p:clrMapOvr>
+</p:notes>
+</file>
+
+<file path=ppt/notesSlides/notesSlide5.xml><?xml version="1.0" encoding="utf-8"?>
+<p:notes xmlns:a="http://schemas.openxmlformats.org/drawingml/2006/main" xmlns:r="http://schemas.openxmlformats.org/officeDocument/2006/relationships" xmlns:p="http://schemas.openxmlformats.org/presentationml/2006/main">
+  <p:cSld>
+    <p:spTree>
+      <p:nvGrpSpPr>
+        <p:cNvPr id="1" name=""/>
+        <p:cNvGrpSpPr/>
+        <p:nvPr/>
+      </p:nvGrpSpPr>
+      <p:grpSpPr>
+        <a:xfrm>
+          <a:off x="0" y="0"/>
+          <a:ext cx="0" cy="0"/>
+          <a:chOff x="0" y="0"/>
+          <a:chExt cx="0" cy="0"/>
+        </a:xfrm>
+      </p:grpSpPr>
+      <p:sp>
+        <p:nvSpPr>
+          <p:cNvPr id="2" name="Slide Image Placeholder 1"/>
+          <p:cNvSpPr>
+            <a:spLocks noGrp="1" noRot="1" noChangeAspect="1"/>
+          </p:cNvSpPr>
+          <p:nvPr>
+            <p:ph type="sldImg"/>
+          </p:nvPr>
+        </p:nvSpPr>
+        <p:spPr/>
+      </p:sp>
+      <p:sp>
+        <p:nvSpPr>
+          <p:cNvPr id="3" name="Notes Placeholder 2"/>
+          <p:cNvSpPr>
+            <a:spLocks noGrp="1"/>
+          </p:cNvSpPr>
+          <p:nvPr>
+            <p:ph type="body" idx="1"/>
+          </p:nvPr>
+        </p:nvSpPr>
+        <p:spPr/>
+        <p:txBody>
+          <a:bodyPr/>
+          <a:lstStyle/>
+          <a:p>
+            <a:r>
+              <a:rPr lang="en-US" dirty="0"/>
+              <a:t>Eastern Europe definitely shows lower life expectancy than Western Europe</a:t>
+            </a:r>
+          </a:p>
+        </p:txBody>
+      </p:sp>
+      <p:sp>
+        <p:nvSpPr>
+          <p:cNvPr id="4" name="Slide Number Placeholder 3"/>
+          <p:cNvSpPr>
+            <a:spLocks noGrp="1"/>
+          </p:cNvSpPr>
+          <p:nvPr>
+            <p:ph type="sldNum" sz="quarter" idx="5"/>
+          </p:nvPr>
+        </p:nvSpPr>
+        <p:spPr/>
+        <p:txBody>
+          <a:bodyPr/>
+          <a:lstStyle/>
+          <a:p>
+            <a:fld id="{6D1583D5-8638-4A9E-A2AF-359F022BD2AC}" type="slidenum">
+              <a:rPr lang="en-US" smtClean="0"/>
+              <a:t>7</a:t>
+            </a:fld>
+            <a:endParaRPr lang="en-US"/>
+          </a:p>
+        </p:txBody>
+      </p:sp>
+    </p:spTree>
+    <p:extLst>
+      <p:ext uri="{BB962C8B-B14F-4D97-AF65-F5344CB8AC3E}">
+        <p14:creationId xmlns:p14="http://schemas.microsoft.com/office/powerpoint/2010/main" val="1543996455"/>
+      </p:ext>
+    </p:extLst>
+  </p:cSld>
+  <p:clrMapOvr>
+    <a:masterClrMapping/>
+  </p:clrMapOvr>
+</p:notes>
+</file>
+
+<file path=ppt/notesSlides/notesSlide6.xml><?xml version="1.0" encoding="utf-8"?>
+<p:notes xmlns:a="http://schemas.openxmlformats.org/drawingml/2006/main" xmlns:r="http://schemas.openxmlformats.org/officeDocument/2006/relationships" xmlns:p="http://schemas.openxmlformats.org/presentationml/2006/main">
+  <p:cSld>
+    <p:spTree>
+      <p:nvGrpSpPr>
+        <p:cNvPr id="1" name=""/>
+        <p:cNvGrpSpPr/>
+        <p:nvPr/>
+      </p:nvGrpSpPr>
+      <p:grpSpPr>
+        <a:xfrm>
+          <a:off x="0" y="0"/>
+          <a:ext cx="0" cy="0"/>
+          <a:chOff x="0" y="0"/>
+          <a:chExt cx="0" cy="0"/>
+        </a:xfrm>
+      </p:grpSpPr>
+      <p:sp>
+        <p:nvSpPr>
+          <p:cNvPr id="2" name="Slide Image Placeholder 1"/>
+          <p:cNvSpPr>
+            <a:spLocks noGrp="1" noRot="1" noChangeAspect="1"/>
+          </p:cNvSpPr>
+          <p:nvPr>
+            <p:ph type="sldImg"/>
+          </p:nvPr>
+        </p:nvSpPr>
+        <p:spPr/>
+      </p:sp>
+      <p:sp>
+        <p:nvSpPr>
+          <p:cNvPr id="3" name="Notes Placeholder 2"/>
+          <p:cNvSpPr>
+            <a:spLocks noGrp="1"/>
+          </p:cNvSpPr>
+          <p:nvPr>
+            <p:ph type="body" idx="1"/>
+          </p:nvPr>
+        </p:nvSpPr>
+        <p:spPr/>
+        <p:txBody>
+          <a:bodyPr/>
+          <a:lstStyle/>
+          <a:p>
+            <a:r>
+              <a:rPr lang="en-US" dirty="0"/>
+              <a:t>Life expectancy is improving each year</a:t>
+            </a:r>
+          </a:p>
+        </p:txBody>
+      </p:sp>
+      <p:sp>
+        <p:nvSpPr>
+          <p:cNvPr id="4" name="Slide Number Placeholder 3"/>
+          <p:cNvSpPr>
+            <a:spLocks noGrp="1"/>
+          </p:cNvSpPr>
+          <p:nvPr>
+            <p:ph type="sldNum" sz="quarter" idx="5"/>
+          </p:nvPr>
+        </p:nvSpPr>
+        <p:spPr/>
+        <p:txBody>
+          <a:bodyPr/>
+          <a:lstStyle/>
+          <a:p>
+            <a:fld id="{6D1583D5-8638-4A9E-A2AF-359F022BD2AC}" type="slidenum">
+              <a:rPr lang="en-US" smtClean="0"/>
+              <a:t>8</a:t>
+            </a:fld>
+            <a:endParaRPr lang="en-US"/>
+          </a:p>
+        </p:txBody>
+      </p:sp>
+    </p:spTree>
+    <p:extLst>
+      <p:ext uri="{BB962C8B-B14F-4D97-AF65-F5344CB8AC3E}">
+        <p14:creationId xmlns:p14="http://schemas.microsoft.com/office/powerpoint/2010/main" val="1194895445"/>
+      </p:ext>
+    </p:extLst>
+  </p:cSld>
+  <p:clrMapOvr>
+    <a:masterClrMapping/>
+  </p:clrMapOvr>
+</p:notes>
+</file>
+
+<file path=ppt/notesSlides/notesSlide7.xml><?xml version="1.0" encoding="utf-8"?>
+<p:notes xmlns:a="http://schemas.openxmlformats.org/drawingml/2006/main" xmlns:r="http://schemas.openxmlformats.org/officeDocument/2006/relationships" xmlns:p="http://schemas.openxmlformats.org/presentationml/2006/main">
+  <p:cSld>
+    <p:spTree>
+      <p:nvGrpSpPr>
+        <p:cNvPr id="1" name=""/>
+        <p:cNvGrpSpPr/>
+        <p:nvPr/>
+      </p:nvGrpSpPr>
+      <p:grpSpPr>
+        <a:xfrm>
+          <a:off x="0" y="0"/>
+          <a:ext cx="0" cy="0"/>
+          <a:chOff x="0" y="0"/>
+          <a:chExt cx="0" cy="0"/>
+        </a:xfrm>
+      </p:grpSpPr>
+      <p:sp>
+        <p:nvSpPr>
+          <p:cNvPr id="2" name="Slide Image Placeholder 1"/>
+          <p:cNvSpPr>
+            <a:spLocks noGrp="1" noRot="1" noChangeAspect="1"/>
+          </p:cNvSpPr>
+          <p:nvPr>
+            <p:ph type="sldImg"/>
+          </p:nvPr>
+        </p:nvSpPr>
+        <p:spPr/>
+      </p:sp>
+      <p:sp>
+        <p:nvSpPr>
+          <p:cNvPr id="3" name="Notes Placeholder 2"/>
+          <p:cNvSpPr>
+            <a:spLocks noGrp="1"/>
+          </p:cNvSpPr>
+          <p:nvPr>
+            <p:ph type="body" idx="1"/>
+          </p:nvPr>
+        </p:nvSpPr>
+        <p:spPr/>
+        <p:txBody>
+          <a:bodyPr/>
+          <a:lstStyle/>
+          <a:p>
+            <a:r>
+              <a:rPr lang="en-US" dirty="0"/>
+              <a:t>Plots show that the distribution for women is shifted higher for life expectancy than men and also the range for men extends much lower</a:t>
+            </a:r>
+          </a:p>
+        </p:txBody>
+      </p:sp>
+      <p:sp>
+        <p:nvSpPr>
+          <p:cNvPr id="4" name="Slide Number Placeholder 3"/>
+          <p:cNvSpPr>
+            <a:spLocks noGrp="1"/>
+          </p:cNvSpPr>
+          <p:nvPr>
+            <p:ph type="sldNum" sz="quarter" idx="5"/>
+          </p:nvPr>
+        </p:nvSpPr>
+        <p:spPr/>
+        <p:txBody>
+          <a:bodyPr/>
+          <a:lstStyle/>
+          <a:p>
+            <a:fld id="{6D1583D5-8638-4A9E-A2AF-359F022BD2AC}" type="slidenum">
+              <a:rPr lang="en-US" smtClean="0"/>
+              <a:t>9</a:t>
+            </a:fld>
+            <a:endParaRPr lang="en-US"/>
+          </a:p>
+        </p:txBody>
+      </p:sp>
+    </p:spTree>
+    <p:extLst>
+      <p:ext uri="{BB962C8B-B14F-4D97-AF65-F5344CB8AC3E}">
+        <p14:creationId xmlns:p14="http://schemas.microsoft.com/office/powerpoint/2010/main" val="3042704916"/>
+      </p:ext>
+    </p:extLst>
+  </p:cSld>
+  <p:clrMapOvr>
+    <a:masterClrMapping/>
+  </p:clrMapOvr>
+</p:notes>
+</file>
+
+<file path=ppt/notesSlides/notesSlide8.xml><?xml version="1.0" encoding="utf-8"?>
+<p:notes xmlns:a="http://schemas.openxmlformats.org/drawingml/2006/main" xmlns:r="http://schemas.openxmlformats.org/officeDocument/2006/relationships" xmlns:p="http://schemas.openxmlformats.org/presentationml/2006/main">
+  <p:cSld>
+    <p:spTree>
+      <p:nvGrpSpPr>
+        <p:cNvPr id="1" name=""/>
+        <p:cNvGrpSpPr/>
+        <p:nvPr/>
+      </p:nvGrpSpPr>
+      <p:grpSpPr>
+        <a:xfrm>
+          <a:off x="0" y="0"/>
+          <a:ext cx="0" cy="0"/>
+          <a:chOff x="0" y="0"/>
+          <a:chExt cx="0" cy="0"/>
+        </a:xfrm>
+      </p:grpSpPr>
+      <p:sp>
+        <p:nvSpPr>
+          <p:cNvPr id="2" name="Slide Image Placeholder 1"/>
+          <p:cNvSpPr>
+            <a:spLocks noGrp="1" noRot="1" noChangeAspect="1"/>
+          </p:cNvSpPr>
+          <p:nvPr>
+            <p:ph type="sldImg"/>
+          </p:nvPr>
+        </p:nvSpPr>
+        <p:spPr/>
+      </p:sp>
+      <p:sp>
+        <p:nvSpPr>
+          <p:cNvPr id="3" name="Notes Placeholder 2"/>
+          <p:cNvSpPr>
+            <a:spLocks noGrp="1"/>
+          </p:cNvSpPr>
+          <p:nvPr>
+            <p:ph type="body" idx="1"/>
+          </p:nvPr>
+        </p:nvSpPr>
+        <p:spPr/>
+        <p:txBody>
+          <a:bodyPr/>
+          <a:lstStyle/>
+          <a:p>
+            <a:r>
+              <a:rPr lang="en-US" dirty="0"/>
+              <a:t>We can see that men always have a lower life expectancy than women for each country</a:t>
+            </a:r>
+          </a:p>
+        </p:txBody>
+      </p:sp>
+      <p:sp>
+        <p:nvSpPr>
+          <p:cNvPr id="4" name="Slide Number Placeholder 3"/>
+          <p:cNvSpPr>
+            <a:spLocks noGrp="1"/>
+          </p:cNvSpPr>
+          <p:nvPr>
+            <p:ph type="sldNum" sz="quarter" idx="5"/>
+          </p:nvPr>
+        </p:nvSpPr>
+        <p:spPr/>
+        <p:txBody>
+          <a:bodyPr/>
+          <a:lstStyle/>
+          <a:p>
+            <a:fld id="{6D1583D5-8638-4A9E-A2AF-359F022BD2AC}" type="slidenum">
+              <a:rPr lang="en-US" smtClean="0"/>
+              <a:t>10</a:t>
+            </a:fld>
+            <a:endParaRPr lang="en-US"/>
+          </a:p>
+        </p:txBody>
+      </p:sp>
+    </p:spTree>
+    <p:extLst>
+      <p:ext uri="{BB962C8B-B14F-4D97-AF65-F5344CB8AC3E}">
+        <p14:creationId xmlns:p14="http://schemas.microsoft.com/office/powerpoint/2010/main" val="463512394"/>
+      </p:ext>
+    </p:extLst>
+  </p:cSld>
+  <p:clrMapOvr>
+    <a:masterClrMapping/>
+  </p:clrMapOvr>
+</p:notes>
+</file>
+
+<file path=ppt/notesSlides/notesSlide9.xml><?xml version="1.0" encoding="utf-8"?>
+<p:notes xmlns:a="http://schemas.openxmlformats.org/drawingml/2006/main" xmlns:r="http://schemas.openxmlformats.org/officeDocument/2006/relationships" xmlns:p="http://schemas.openxmlformats.org/presentationml/2006/main">
+  <p:cSld>
+    <p:spTree>
+      <p:nvGrpSpPr>
+        <p:cNvPr id="1" name=""/>
+        <p:cNvGrpSpPr/>
+        <p:nvPr/>
+      </p:nvGrpSpPr>
+      <p:grpSpPr>
+        <a:xfrm>
+          <a:off x="0" y="0"/>
+          <a:ext cx="0" cy="0"/>
+          <a:chOff x="0" y="0"/>
+          <a:chExt cx="0" cy="0"/>
+        </a:xfrm>
+      </p:grpSpPr>
+      <p:sp>
+        <p:nvSpPr>
+          <p:cNvPr id="2" name="Slide Image Placeholder 1"/>
+          <p:cNvSpPr>
+            <a:spLocks noGrp="1" noRot="1" noChangeAspect="1"/>
+          </p:cNvSpPr>
+          <p:nvPr>
+            <p:ph type="sldImg"/>
+          </p:nvPr>
+        </p:nvSpPr>
+        <p:spPr/>
+      </p:sp>
+      <p:sp>
+        <p:nvSpPr>
+          <p:cNvPr id="3" name="Notes Placeholder 2"/>
+          <p:cNvSpPr>
+            <a:spLocks noGrp="1"/>
+          </p:cNvSpPr>
+          <p:nvPr>
+            <p:ph type="body" idx="1"/>
+          </p:nvPr>
+        </p:nvSpPr>
+        <p:spPr/>
+        <p:txBody>
+          <a:bodyPr/>
+          <a:lstStyle/>
+          <a:p>
+            <a:r>
+              <a:rPr lang="en-US" dirty="0"/>
+              <a:t>This shows that there isn’t a correlation for women with education, but for men there is a slight correlation.  The reason might be that the jobs that women with lower education do not affect their health, but jobs that men have with lower education have a bad influence on their health.</a:t>
+            </a:r>
+          </a:p>
+        </p:txBody>
+      </p:sp>
+      <p:sp>
+        <p:nvSpPr>
+          <p:cNvPr id="4" name="Slide Number Placeholder 3"/>
+          <p:cNvSpPr>
+            <a:spLocks noGrp="1"/>
+          </p:cNvSpPr>
+          <p:nvPr>
+            <p:ph type="sldNum" sz="quarter" idx="5"/>
+          </p:nvPr>
+        </p:nvSpPr>
+        <p:spPr/>
+        <p:txBody>
+          <a:bodyPr/>
+          <a:lstStyle/>
+          <a:p>
+            <a:fld id="{6D1583D5-8638-4A9E-A2AF-359F022BD2AC}" type="slidenum">
+              <a:rPr lang="en-US" smtClean="0"/>
+              <a:t>11</a:t>
+            </a:fld>
+            <a:endParaRPr lang="en-US"/>
+          </a:p>
+        </p:txBody>
+      </p:sp>
+    </p:spTree>
+    <p:extLst>
+      <p:ext uri="{BB962C8B-B14F-4D97-AF65-F5344CB8AC3E}">
+        <p14:creationId xmlns:p14="http://schemas.microsoft.com/office/powerpoint/2010/main" val="1239805198"/>
+      </p:ext>
+    </p:extLst>
+  </p:cSld>
+  <p:clrMapOvr>
+    <a:masterClrMapping/>
+  </p:clrMapOvr>
+</p:notes>
 </file>
 
 <file path=ppt/slideLayouts/slideLayout1.xml><?xml version="1.0" encoding="utf-8"?>
@@ -7347,7 +8943,7 @@
 </p:sld>
 </file>
 
-<file path=ppt/slides/slide2.xml><?xml version="1.0" encoding="utf-8"?>
+<file path=ppt/slides/slide10.xml><?xml version="1.0" encoding="utf-8"?>
 <p:sld xmlns:a="http://schemas.openxmlformats.org/drawingml/2006/main" xmlns:r="http://schemas.openxmlformats.org/officeDocument/2006/relationships" xmlns:p="http://schemas.openxmlformats.org/presentationml/2006/main">
   <p:cSld>
     <p:spTree>
@@ -7369,7 +8965,7 @@
           <p:cNvPr id="2" name="Title 1">
             <a:extLst>
               <a:ext uri="{FF2B5EF4-FFF2-40B4-BE49-F238E27FC236}">
-                <a16:creationId xmlns:a16="http://schemas.microsoft.com/office/drawing/2014/main" id="{993D9726-0A1A-498E-93C2-134C4B5A64E7}"/>
+                <a16:creationId xmlns:a16="http://schemas.microsoft.com/office/drawing/2014/main" id="{6C0944A9-93FA-43EF-A3DB-9DEE6F35CE4A}"/>
               </a:ext>
             </a:extLst>
           </p:cNvPr>
@@ -7387,7 +8983,189 @@
           <a:p>
             <a:r>
               <a:rPr lang="en-US" dirty="0"/>
-              <a:t>Hypothesis:</a:t>
+              <a:t>Violin Plots of Life Expectancy by Country</a:t>
+            </a:r>
+          </a:p>
+        </p:txBody>
+      </p:sp>
+      <p:pic>
+        <p:nvPicPr>
+          <p:cNvPr id="6" name="Picture 5" descr="A picture containing text, candelabrum&#10;&#10;Description automatically generated">
+            <a:extLst>
+              <a:ext uri="{FF2B5EF4-FFF2-40B4-BE49-F238E27FC236}">
+                <a16:creationId xmlns:a16="http://schemas.microsoft.com/office/drawing/2014/main" id="{EDF232AF-E2B0-440C-B040-3E2AD9CF8F03}"/>
+              </a:ext>
+            </a:extLst>
+          </p:cNvPr>
+          <p:cNvPicPr>
+            <a:picLocks noChangeAspect="1"/>
+          </p:cNvPicPr>
+          <p:nvPr/>
+        </p:nvPicPr>
+        <p:blipFill>
+          <a:blip r:embed="rId3">
+            <a:extLst>
+              <a:ext uri="{28A0092B-C50C-407E-A947-70E740481C1C}">
+                <a14:useLocalDpi xmlns:a14="http://schemas.microsoft.com/office/drawing/2010/main" val="0"/>
+              </a:ext>
+            </a:extLst>
+          </a:blip>
+          <a:stretch>
+            <a:fillRect/>
+          </a:stretch>
+        </p:blipFill>
+        <p:spPr>
+          <a:xfrm>
+            <a:off x="0" y="1397000"/>
+            <a:ext cx="12192000" cy="4064000"/>
+          </a:xfrm>
+          <a:prstGeom prst="rect">
+            <a:avLst/>
+          </a:prstGeom>
+        </p:spPr>
+      </p:pic>
+    </p:spTree>
+    <p:extLst>
+      <p:ext uri="{BB962C8B-B14F-4D97-AF65-F5344CB8AC3E}">
+        <p14:creationId xmlns:p14="http://schemas.microsoft.com/office/powerpoint/2010/main" val="2807429900"/>
+      </p:ext>
+    </p:extLst>
+  </p:cSld>
+  <p:clrMapOvr>
+    <a:masterClrMapping/>
+  </p:clrMapOvr>
+</p:sld>
+</file>
+
+<file path=ppt/slides/slide11.xml><?xml version="1.0" encoding="utf-8"?>
+<p:sld xmlns:a="http://schemas.openxmlformats.org/drawingml/2006/main" xmlns:r="http://schemas.openxmlformats.org/officeDocument/2006/relationships" xmlns:p="http://schemas.openxmlformats.org/presentationml/2006/main">
+  <p:cSld>
+    <p:spTree>
+      <p:nvGrpSpPr>
+        <p:cNvPr id="1" name=""/>
+        <p:cNvGrpSpPr/>
+        <p:nvPr/>
+      </p:nvGrpSpPr>
+      <p:grpSpPr>
+        <a:xfrm>
+          <a:off x="0" y="0"/>
+          <a:ext cx="0" cy="0"/>
+          <a:chOff x="0" y="0"/>
+          <a:chExt cx="0" cy="0"/>
+        </a:xfrm>
+      </p:grpSpPr>
+      <p:sp>
+        <p:nvSpPr>
+          <p:cNvPr id="2" name="Title 1">
+            <a:extLst>
+              <a:ext uri="{FF2B5EF4-FFF2-40B4-BE49-F238E27FC236}">
+                <a16:creationId xmlns:a16="http://schemas.microsoft.com/office/drawing/2014/main" id="{6C0944A9-93FA-43EF-A3DB-9DEE6F35CE4A}"/>
+              </a:ext>
+            </a:extLst>
+          </p:cNvPr>
+          <p:cNvSpPr>
+            <a:spLocks noGrp="1"/>
+          </p:cNvSpPr>
+          <p:nvPr>
+            <p:ph type="title"/>
+          </p:nvPr>
+        </p:nvSpPr>
+        <p:spPr/>
+        <p:txBody>
+          <a:bodyPr/>
+          <a:lstStyle/>
+          <a:p>
+            <a:r>
+              <a:rPr lang="en-US" dirty="0"/>
+              <a:t>Correlation between Life Expectancy and Education (ED5-8) for 2019</a:t>
+            </a:r>
+          </a:p>
+        </p:txBody>
+      </p:sp>
+      <p:pic>
+        <p:nvPicPr>
+          <p:cNvPr id="5" name="Picture 4" descr="Chart, scatter chart&#10;&#10;Description automatically generated">
+            <a:extLst>
+              <a:ext uri="{FF2B5EF4-FFF2-40B4-BE49-F238E27FC236}">
+                <a16:creationId xmlns:a16="http://schemas.microsoft.com/office/drawing/2014/main" id="{B8830913-28E2-47F8-A241-E188A2ED7143}"/>
+              </a:ext>
+            </a:extLst>
+          </p:cNvPr>
+          <p:cNvPicPr>
+            <a:picLocks noChangeAspect="1"/>
+          </p:cNvPicPr>
+          <p:nvPr/>
+        </p:nvPicPr>
+        <p:blipFill>
+          <a:blip r:embed="rId3"/>
+          <a:stretch>
+            <a:fillRect/>
+          </a:stretch>
+        </p:blipFill>
+        <p:spPr>
+          <a:xfrm>
+            <a:off x="1558855" y="1606128"/>
+            <a:ext cx="9074289" cy="4886747"/>
+          </a:xfrm>
+          <a:prstGeom prst="rect">
+            <a:avLst/>
+          </a:prstGeom>
+        </p:spPr>
+      </p:pic>
+    </p:spTree>
+    <p:extLst>
+      <p:ext uri="{BB962C8B-B14F-4D97-AF65-F5344CB8AC3E}">
+        <p14:creationId xmlns:p14="http://schemas.microsoft.com/office/powerpoint/2010/main" val="1597181047"/>
+      </p:ext>
+    </p:extLst>
+  </p:cSld>
+  <p:clrMapOvr>
+    <a:masterClrMapping/>
+  </p:clrMapOvr>
+</p:sld>
+</file>
+
+<file path=ppt/slides/slide12.xml><?xml version="1.0" encoding="utf-8"?>
+<p:sld xmlns:a="http://schemas.openxmlformats.org/drawingml/2006/main" xmlns:r="http://schemas.openxmlformats.org/officeDocument/2006/relationships" xmlns:p="http://schemas.openxmlformats.org/presentationml/2006/main">
+  <p:cSld>
+    <p:spTree>
+      <p:nvGrpSpPr>
+        <p:cNvPr id="1" name=""/>
+        <p:cNvGrpSpPr/>
+        <p:nvPr/>
+      </p:nvGrpSpPr>
+      <p:grpSpPr>
+        <a:xfrm>
+          <a:off x="0" y="0"/>
+          <a:ext cx="0" cy="0"/>
+          <a:chOff x="0" y="0"/>
+          <a:chExt cx="0" cy="0"/>
+        </a:xfrm>
+      </p:grpSpPr>
+      <p:sp>
+        <p:nvSpPr>
+          <p:cNvPr id="2" name="Title 1">
+            <a:extLst>
+              <a:ext uri="{FF2B5EF4-FFF2-40B4-BE49-F238E27FC236}">
+                <a16:creationId xmlns:a16="http://schemas.microsoft.com/office/drawing/2014/main" id="{993D9726-0A1A-498E-93C2-134C4B5A64E7}"/>
+              </a:ext>
+            </a:extLst>
+          </p:cNvPr>
+          <p:cNvSpPr>
+            <a:spLocks noGrp="1"/>
+          </p:cNvSpPr>
+          <p:nvPr>
+            <p:ph type="title"/>
+          </p:nvPr>
+        </p:nvSpPr>
+        <p:spPr/>
+        <p:txBody>
+          <a:bodyPr/>
+          <a:lstStyle/>
+          <a:p>
+            <a:r>
+              <a:rPr lang="en-US" dirty="0"/>
+              <a:t>Conclusions:</a:t>
             </a:r>
           </a:p>
         </p:txBody>
@@ -7415,7 +9193,9 @@
           </a:xfrm>
         </p:spPr>
         <p:txBody>
-          <a:bodyPr/>
+          <a:bodyPr>
+            <a:normAutofit/>
+          </a:bodyPr>
           <a:lstStyle/>
           <a:p>
             <a:pPr>
@@ -7425,7 +9205,7 @@
             </a:pPr>
             <a:r>
               <a:rPr lang="en-US" dirty="0"/>
-              <a:t>Higher education rates correlates with increased life expectancy</a:t>
+              <a:t>Higher education rates do correlate with increased life expectancy, but…</a:t>
             </a:r>
           </a:p>
           <a:p>
@@ -7436,7 +9216,7 @@
             </a:pPr>
             <a:r>
               <a:rPr lang="en-US" dirty="0"/>
-              <a:t>Is there a difference between male and females?</a:t>
+              <a:t>There is a difference when it comes to males and females.</a:t>
             </a:r>
           </a:p>
           <a:p>
@@ -7447,8 +9227,16 @@
             </a:pPr>
             <a:r>
               <a:rPr lang="en-US" dirty="0"/>
-              <a:t>Does the education rate between countries influence their life expectancy?</a:t>
+              <a:t>The education rate between countries does have a slight influence on male life expectancy, especially at the higher rates.</a:t>
             </a:r>
+          </a:p>
+          <a:p>
+            <a:pPr lvl="1">
+              <a:lnSpc>
+                <a:spcPct val="150000"/>
+              </a:lnSpc>
+            </a:pPr>
+            <a:endParaRPr lang="en-US" dirty="0"/>
           </a:p>
         </p:txBody>
       </p:sp>
@@ -7481,7 +9269,7 @@
         </p:blipFill>
         <p:spPr bwMode="auto">
           <a:xfrm>
-            <a:off x="8525487" y="1970536"/>
+            <a:off x="9624550" y="1825625"/>
             <a:ext cx="1584574" cy="954034"/>
           </a:xfrm>
           <a:prstGeom prst="rect">
@@ -7528,7 +9316,486 @@
         </p:blipFill>
         <p:spPr bwMode="auto">
           <a:xfrm>
-            <a:off x="8660566" y="3933431"/>
+            <a:off x="8292762" y="4340225"/>
+            <a:ext cx="2124075" cy="2152650"/>
+          </a:xfrm>
+          <a:prstGeom prst="rect">
+            <a:avLst/>
+          </a:prstGeom>
+          <a:noFill/>
+          <a:extLst>
+            <a:ext uri="{909E8E84-426E-40DD-AFC4-6F175D3DCCD1}">
+              <a14:hiddenFill xmlns:a14="http://schemas.microsoft.com/office/drawing/2010/main">
+                <a:solidFill>
+                  <a:srgbClr val="FFFFFF"/>
+                </a:solidFill>
+              </a14:hiddenFill>
+            </a:ext>
+          </a:extLst>
+        </p:spPr>
+      </p:pic>
+    </p:spTree>
+    <p:extLst>
+      <p:ext uri="{BB962C8B-B14F-4D97-AF65-F5344CB8AC3E}">
+        <p14:creationId xmlns:p14="http://schemas.microsoft.com/office/powerpoint/2010/main" val="1379012888"/>
+      </p:ext>
+    </p:extLst>
+  </p:cSld>
+  <p:clrMapOvr>
+    <a:masterClrMapping/>
+  </p:clrMapOvr>
+  <p:timing>
+    <p:tnLst>
+      <p:par>
+        <p:cTn id="1" dur="indefinite" restart="never" nodeType="tmRoot">
+          <p:childTnLst>
+            <p:seq concurrent="1" nextAc="seek">
+              <p:cTn id="2" dur="indefinite" nodeType="mainSeq">
+                <p:childTnLst>
+                  <p:par>
+                    <p:cTn id="3" fill="hold">
+                      <p:stCondLst>
+                        <p:cond delay="indefinite"/>
+                      </p:stCondLst>
+                      <p:childTnLst>
+                        <p:par>
+                          <p:cTn id="4" fill="hold">
+                            <p:stCondLst>
+                              <p:cond delay="0"/>
+                            </p:stCondLst>
+                            <p:childTnLst>
+                              <p:par>
+                                <p:cTn id="5" presetID="1" presetClass="entr" presetSubtype="0" fill="hold" nodeType="clickEffect">
+                                  <p:stCondLst>
+                                    <p:cond delay="0"/>
+                                  </p:stCondLst>
+                                  <p:childTnLst>
+                                    <p:set>
+                                      <p:cBhvr>
+                                        <p:cTn id="6" dur="1" fill="hold">
+                                          <p:stCondLst>
+                                            <p:cond delay="0"/>
+                                          </p:stCondLst>
+                                        </p:cTn>
+                                        <p:tgtEl>
+                                          <p:spTgt spid="3">
+                                            <p:txEl>
+                                              <p:pRg st="0" end="0"/>
+                                            </p:txEl>
+                                          </p:spTgt>
+                                        </p:tgtEl>
+                                        <p:attrNameLst>
+                                          <p:attrName>style.visibility</p:attrName>
+                                        </p:attrNameLst>
+                                      </p:cBhvr>
+                                      <p:to>
+                                        <p:strVal val="visible"/>
+                                      </p:to>
+                                    </p:set>
+                                  </p:childTnLst>
+                                </p:cTn>
+                              </p:par>
+                            </p:childTnLst>
+                          </p:cTn>
+                        </p:par>
+                      </p:childTnLst>
+                    </p:cTn>
+                  </p:par>
+                  <p:par>
+                    <p:cTn id="7" fill="hold">
+                      <p:stCondLst>
+                        <p:cond delay="indefinite"/>
+                      </p:stCondLst>
+                      <p:childTnLst>
+                        <p:par>
+                          <p:cTn id="8" fill="hold">
+                            <p:stCondLst>
+                              <p:cond delay="0"/>
+                            </p:stCondLst>
+                            <p:childTnLst>
+                              <p:par>
+                                <p:cTn id="9" presetID="1" presetClass="entr" presetSubtype="0" fill="hold" nodeType="clickEffect">
+                                  <p:stCondLst>
+                                    <p:cond delay="0"/>
+                                  </p:stCondLst>
+                                  <p:childTnLst>
+                                    <p:set>
+                                      <p:cBhvr>
+                                        <p:cTn id="10" dur="1" fill="hold">
+                                          <p:stCondLst>
+                                            <p:cond delay="0"/>
+                                          </p:stCondLst>
+                                        </p:cTn>
+                                        <p:tgtEl>
+                                          <p:spTgt spid="3">
+                                            <p:txEl>
+                                              <p:pRg st="1" end="1"/>
+                                            </p:txEl>
+                                          </p:spTgt>
+                                        </p:tgtEl>
+                                        <p:attrNameLst>
+                                          <p:attrName>style.visibility</p:attrName>
+                                        </p:attrNameLst>
+                                      </p:cBhvr>
+                                      <p:to>
+                                        <p:strVal val="visible"/>
+                                      </p:to>
+                                    </p:set>
+                                  </p:childTnLst>
+                                </p:cTn>
+                              </p:par>
+                            </p:childTnLst>
+                          </p:cTn>
+                        </p:par>
+                      </p:childTnLst>
+                    </p:cTn>
+                  </p:par>
+                  <p:par>
+                    <p:cTn id="11" fill="hold">
+                      <p:stCondLst>
+                        <p:cond delay="indefinite"/>
+                      </p:stCondLst>
+                      <p:childTnLst>
+                        <p:par>
+                          <p:cTn id="12" fill="hold">
+                            <p:stCondLst>
+                              <p:cond delay="0"/>
+                            </p:stCondLst>
+                            <p:childTnLst>
+                              <p:par>
+                                <p:cTn id="13" presetID="1" presetClass="entr" presetSubtype="0" fill="hold" nodeType="clickEffect">
+                                  <p:stCondLst>
+                                    <p:cond delay="0"/>
+                                  </p:stCondLst>
+                                  <p:childTnLst>
+                                    <p:set>
+                                      <p:cBhvr>
+                                        <p:cTn id="14" dur="1" fill="hold">
+                                          <p:stCondLst>
+                                            <p:cond delay="0"/>
+                                          </p:stCondLst>
+                                        </p:cTn>
+                                        <p:tgtEl>
+                                          <p:spTgt spid="1026"/>
+                                        </p:tgtEl>
+                                        <p:attrNameLst>
+                                          <p:attrName>style.visibility</p:attrName>
+                                        </p:attrNameLst>
+                                      </p:cBhvr>
+                                      <p:to>
+                                        <p:strVal val="visible"/>
+                                      </p:to>
+                                    </p:set>
+                                  </p:childTnLst>
+                                </p:cTn>
+                              </p:par>
+                            </p:childTnLst>
+                          </p:cTn>
+                        </p:par>
+                      </p:childTnLst>
+                    </p:cTn>
+                  </p:par>
+                  <p:par>
+                    <p:cTn id="15" fill="hold">
+                      <p:stCondLst>
+                        <p:cond delay="indefinite"/>
+                      </p:stCondLst>
+                      <p:childTnLst>
+                        <p:par>
+                          <p:cTn id="16" fill="hold">
+                            <p:stCondLst>
+                              <p:cond delay="0"/>
+                            </p:stCondLst>
+                            <p:childTnLst>
+                              <p:par>
+                                <p:cTn id="17" presetID="1" presetClass="entr" presetSubtype="0" fill="hold" nodeType="clickEffect">
+                                  <p:stCondLst>
+                                    <p:cond delay="0"/>
+                                  </p:stCondLst>
+                                  <p:childTnLst>
+                                    <p:set>
+                                      <p:cBhvr>
+                                        <p:cTn id="18" dur="1" fill="hold">
+                                          <p:stCondLst>
+                                            <p:cond delay="0"/>
+                                          </p:stCondLst>
+                                        </p:cTn>
+                                        <p:tgtEl>
+                                          <p:spTgt spid="3">
+                                            <p:txEl>
+                                              <p:pRg st="2" end="2"/>
+                                            </p:txEl>
+                                          </p:spTgt>
+                                        </p:tgtEl>
+                                        <p:attrNameLst>
+                                          <p:attrName>style.visibility</p:attrName>
+                                        </p:attrNameLst>
+                                      </p:cBhvr>
+                                      <p:to>
+                                        <p:strVal val="visible"/>
+                                      </p:to>
+                                    </p:set>
+                                  </p:childTnLst>
+                                </p:cTn>
+                              </p:par>
+                            </p:childTnLst>
+                          </p:cTn>
+                        </p:par>
+                      </p:childTnLst>
+                    </p:cTn>
+                  </p:par>
+                  <p:par>
+                    <p:cTn id="19" fill="hold">
+                      <p:stCondLst>
+                        <p:cond delay="indefinite"/>
+                      </p:stCondLst>
+                      <p:childTnLst>
+                        <p:par>
+                          <p:cTn id="20" fill="hold">
+                            <p:stCondLst>
+                              <p:cond delay="0"/>
+                            </p:stCondLst>
+                            <p:childTnLst>
+                              <p:par>
+                                <p:cTn id="21" presetID="1" presetClass="entr" presetSubtype="0" fill="hold" nodeType="clickEffect">
+                                  <p:stCondLst>
+                                    <p:cond delay="0"/>
+                                  </p:stCondLst>
+                                  <p:childTnLst>
+                                    <p:set>
+                                      <p:cBhvr>
+                                        <p:cTn id="22" dur="1" fill="hold">
+                                          <p:stCondLst>
+                                            <p:cond delay="0"/>
+                                          </p:stCondLst>
+                                        </p:cTn>
+                                        <p:tgtEl>
+                                          <p:spTgt spid="1028"/>
+                                        </p:tgtEl>
+                                        <p:attrNameLst>
+                                          <p:attrName>style.visibility</p:attrName>
+                                        </p:attrNameLst>
+                                      </p:cBhvr>
+                                      <p:to>
+                                        <p:strVal val="visible"/>
+                                      </p:to>
+                                    </p:set>
+                                  </p:childTnLst>
+                                </p:cTn>
+                              </p:par>
+                            </p:childTnLst>
+                          </p:cTn>
+                        </p:par>
+                      </p:childTnLst>
+                    </p:cTn>
+                  </p:par>
+                </p:childTnLst>
+              </p:cTn>
+              <p:prevCondLst>
+                <p:cond evt="onPrev" delay="0">
+                  <p:tgtEl>
+                    <p:sldTgt/>
+                  </p:tgtEl>
+                </p:cond>
+              </p:prevCondLst>
+              <p:nextCondLst>
+                <p:cond evt="onNext" delay="0">
+                  <p:tgtEl>
+                    <p:sldTgt/>
+                  </p:tgtEl>
+                </p:cond>
+              </p:nextCondLst>
+            </p:seq>
+          </p:childTnLst>
+        </p:cTn>
+      </p:par>
+    </p:tnLst>
+  </p:timing>
+</p:sld>
+</file>
+
+<file path=ppt/slides/slide2.xml><?xml version="1.0" encoding="utf-8"?>
+<p:sld xmlns:a="http://schemas.openxmlformats.org/drawingml/2006/main" xmlns:r="http://schemas.openxmlformats.org/officeDocument/2006/relationships" xmlns:p="http://schemas.openxmlformats.org/presentationml/2006/main">
+  <p:cSld>
+    <p:spTree>
+      <p:nvGrpSpPr>
+        <p:cNvPr id="1" name=""/>
+        <p:cNvGrpSpPr/>
+        <p:nvPr/>
+      </p:nvGrpSpPr>
+      <p:grpSpPr>
+        <a:xfrm>
+          <a:off x="0" y="0"/>
+          <a:ext cx="0" cy="0"/>
+          <a:chOff x="0" y="0"/>
+          <a:chExt cx="0" cy="0"/>
+        </a:xfrm>
+      </p:grpSpPr>
+      <p:sp>
+        <p:nvSpPr>
+          <p:cNvPr id="2" name="Title 1">
+            <a:extLst>
+              <a:ext uri="{FF2B5EF4-FFF2-40B4-BE49-F238E27FC236}">
+                <a16:creationId xmlns:a16="http://schemas.microsoft.com/office/drawing/2014/main" id="{993D9726-0A1A-498E-93C2-134C4B5A64E7}"/>
+              </a:ext>
+            </a:extLst>
+          </p:cNvPr>
+          <p:cNvSpPr>
+            <a:spLocks noGrp="1"/>
+          </p:cNvSpPr>
+          <p:nvPr>
+            <p:ph type="title"/>
+          </p:nvPr>
+        </p:nvSpPr>
+        <p:spPr/>
+        <p:txBody>
+          <a:bodyPr/>
+          <a:lstStyle/>
+          <a:p>
+            <a:r>
+              <a:rPr lang="en-US" dirty="0"/>
+              <a:t>Hypothesis:</a:t>
+            </a:r>
+          </a:p>
+        </p:txBody>
+      </p:sp>
+      <p:sp>
+        <p:nvSpPr>
+          <p:cNvPr id="3" name="Content Placeholder 2">
+            <a:extLst>
+              <a:ext uri="{FF2B5EF4-FFF2-40B4-BE49-F238E27FC236}">
+                <a16:creationId xmlns:a16="http://schemas.microsoft.com/office/drawing/2014/main" id="{20E07A58-743A-422E-8ADA-B2D70560B545}"/>
+              </a:ext>
+            </a:extLst>
+          </p:cNvPr>
+          <p:cNvSpPr>
+            <a:spLocks noGrp="1"/>
+          </p:cNvSpPr>
+          <p:nvPr>
+            <p:ph idx="1"/>
+          </p:nvPr>
+        </p:nvSpPr>
+        <p:spPr>
+          <a:xfrm>
+            <a:off x="838200" y="1825625"/>
+            <a:ext cx="7608376" cy="3859742"/>
+          </a:xfrm>
+        </p:spPr>
+        <p:txBody>
+          <a:bodyPr/>
+          <a:lstStyle/>
+          <a:p>
+            <a:pPr>
+              <a:lnSpc>
+                <a:spcPct val="150000"/>
+              </a:lnSpc>
+            </a:pPr>
+            <a:r>
+              <a:rPr lang="en-US" dirty="0"/>
+              <a:t>Higher education rates correlates with increased life expectancy</a:t>
+            </a:r>
+          </a:p>
+          <a:p>
+            <a:pPr lvl="1">
+              <a:lnSpc>
+                <a:spcPct val="150000"/>
+              </a:lnSpc>
+            </a:pPr>
+            <a:r>
+              <a:rPr lang="en-US" dirty="0"/>
+              <a:t>Is there a difference between male and females?</a:t>
+            </a:r>
+          </a:p>
+          <a:p>
+            <a:pPr lvl="1">
+              <a:lnSpc>
+                <a:spcPct val="150000"/>
+              </a:lnSpc>
+            </a:pPr>
+            <a:r>
+              <a:rPr lang="en-US" dirty="0"/>
+              <a:t>Does the education rate between countries influence their life expectancy?</a:t>
+            </a:r>
+          </a:p>
+        </p:txBody>
+      </p:sp>
+      <p:pic>
+        <p:nvPicPr>
+          <p:cNvPr id="1026" name="Picture 2" descr="Draw male and female gender symbols in iOS - Stack Overflow">
+            <a:extLst>
+              <a:ext uri="{FF2B5EF4-FFF2-40B4-BE49-F238E27FC236}">
+                <a16:creationId xmlns:a16="http://schemas.microsoft.com/office/drawing/2014/main" id="{C7D3BB0B-66DB-4EB3-AB57-B1DB92764823}"/>
+              </a:ext>
+            </a:extLst>
+          </p:cNvPr>
+          <p:cNvPicPr>
+            <a:picLocks noChangeAspect="1" noChangeArrowheads="1"/>
+          </p:cNvPicPr>
+          <p:nvPr/>
+        </p:nvPicPr>
+        <p:blipFill>
+          <a:blip r:embed="rId2">
+            <a:extLst>
+              <a:ext uri="{28A0092B-C50C-407E-A947-70E740481C1C}">
+                <a14:useLocalDpi xmlns:a14="http://schemas.microsoft.com/office/drawing/2010/main" val="0"/>
+              </a:ext>
+            </a:extLst>
+          </a:blip>
+          <a:srcRect/>
+          <a:stretch>
+            <a:fillRect/>
+          </a:stretch>
+        </p:blipFill>
+        <p:spPr bwMode="auto">
+          <a:xfrm>
+            <a:off x="9612438" y="1825625"/>
+            <a:ext cx="1584574" cy="954034"/>
+          </a:xfrm>
+          <a:prstGeom prst="rect">
+            <a:avLst/>
+          </a:prstGeom>
+          <a:noFill/>
+          <a:extLst>
+            <a:ext uri="{909E8E84-426E-40DD-AFC4-6F175D3DCCD1}">
+              <a14:hiddenFill xmlns:a14="http://schemas.microsoft.com/office/drawing/2010/main">
+                <a:solidFill>
+                  <a:srgbClr val="FFFFFF"/>
+                </a:solidFill>
+              </a14:hiddenFill>
+            </a:ext>
+          </a:extLst>
+        </p:spPr>
+      </p:pic>
+      <p:pic>
+        <p:nvPicPr>
+          <p:cNvPr id="1028" name="Picture 4" descr="Easy to read - The European Union | European Union">
+            <a:extLst>
+              <a:ext uri="{FF2B5EF4-FFF2-40B4-BE49-F238E27FC236}">
+                <a16:creationId xmlns:a16="http://schemas.microsoft.com/office/drawing/2014/main" id="{6FD683C1-221F-4BC8-B381-88D77D056D0A}"/>
+              </a:ext>
+            </a:extLst>
+          </p:cNvPr>
+          <p:cNvPicPr>
+            <a:picLocks noChangeAspect="1" noChangeArrowheads="1"/>
+          </p:cNvPicPr>
+          <p:nvPr/>
+        </p:nvPicPr>
+        <p:blipFill>
+          <a:blip r:embed="rId3">
+            <a:extLst>
+              <a:ext uri="{28A0092B-C50C-407E-A947-70E740481C1C}">
+                <a14:useLocalDpi xmlns:a14="http://schemas.microsoft.com/office/drawing/2010/main" val="0"/>
+              </a:ext>
+            </a:extLst>
+          </a:blip>
+          <a:srcRect/>
+          <a:stretch>
+            <a:fillRect/>
+          </a:stretch>
+        </p:blipFill>
+        <p:spPr bwMode="auto">
+          <a:xfrm>
+            <a:off x="8280650" y="4340225"/>
             <a:ext cx="2124075" cy="2152650"/>
           </a:xfrm>
           <a:prstGeom prst="rect">
@@ -7866,17 +10133,17 @@
           <a:p>
             <a:r>
               <a:rPr lang="en-US" dirty="0"/>
-              <a:t>Correlation between Life Expectancy Education (ED5-8)</a:t>
+              <a:t>Correlation between Life Expectancy and Education for European Union Countries</a:t>
             </a:r>
           </a:p>
         </p:txBody>
       </p:sp>
       <p:pic>
         <p:nvPicPr>
-          <p:cNvPr id="7" name="Picture 6">
-            <a:extLst>
-              <a:ext uri="{FF2B5EF4-FFF2-40B4-BE49-F238E27FC236}">
-                <a16:creationId xmlns:a16="http://schemas.microsoft.com/office/drawing/2014/main" id="{48E86971-C331-47D2-9203-90A56B25C057}"/>
+          <p:cNvPr id="5" name="Picture 4" descr="Chart, scatter chart&#10;&#10;Description automatically generated">
+            <a:extLst>
+              <a:ext uri="{FF2B5EF4-FFF2-40B4-BE49-F238E27FC236}">
+                <a16:creationId xmlns:a16="http://schemas.microsoft.com/office/drawing/2014/main" id="{AD8FD5FA-75FB-4AC3-9665-342104008B33}"/>
               </a:ext>
             </a:extLst>
           </p:cNvPr>
@@ -7886,15 +10153,15 @@
           <p:nvPr/>
         </p:nvPicPr>
         <p:blipFill>
-          <a:blip r:embed="rId2"/>
+          <a:blip r:embed="rId3"/>
           <a:stretch>
             <a:fillRect/>
           </a:stretch>
         </p:blipFill>
         <p:spPr>
           <a:xfrm>
-            <a:off x="0" y="1640784"/>
-            <a:ext cx="12192000" cy="3576432"/>
+            <a:off x="1277477" y="1690688"/>
+            <a:ext cx="9637045" cy="4802188"/>
           </a:xfrm>
           <a:prstGeom prst="rect">
             <a:avLst/>
@@ -7904,7 +10171,7 @@
     </p:spTree>
     <p:extLst>
       <p:ext uri="{BB962C8B-B14F-4D97-AF65-F5344CB8AC3E}">
-        <p14:creationId xmlns:p14="http://schemas.microsoft.com/office/powerpoint/2010/main" val="1599298110"/>
+        <p14:creationId xmlns:p14="http://schemas.microsoft.com/office/powerpoint/2010/main" val="1616280574"/>
       </p:ext>
     </p:extLst>
   </p:cSld>
@@ -7936,7 +10203,7 @@
           <p:cNvPr id="2" name="Title 1">
             <a:extLst>
               <a:ext uri="{FF2B5EF4-FFF2-40B4-BE49-F238E27FC236}">
-                <a16:creationId xmlns:a16="http://schemas.microsoft.com/office/drawing/2014/main" id="{993D9726-0A1A-498E-93C2-134C4B5A64E7}"/>
+                <a16:creationId xmlns:a16="http://schemas.microsoft.com/office/drawing/2014/main" id="{6C0944A9-93FA-43EF-A3DB-9DEE6F35CE4A}"/>
               </a:ext>
             </a:extLst>
           </p:cNvPr>
@@ -7954,452 +10221,535 @@
           <a:p>
             <a:r>
               <a:rPr lang="en-US" dirty="0"/>
-              <a:t>Conclusions:</a:t>
+              <a:t>Correlation between Life Expectancy and Education (All Data) for 2019</a:t>
             </a:r>
-          </a:p>
-        </p:txBody>
-      </p:sp>
-      <p:sp>
-        <p:nvSpPr>
-          <p:cNvPr id="3" name="Content Placeholder 2">
-            <a:extLst>
-              <a:ext uri="{FF2B5EF4-FFF2-40B4-BE49-F238E27FC236}">
-                <a16:creationId xmlns:a16="http://schemas.microsoft.com/office/drawing/2014/main" id="{20E07A58-743A-422E-8ADA-B2D70560B545}"/>
-              </a:ext>
-            </a:extLst>
-          </p:cNvPr>
-          <p:cNvSpPr>
-            <a:spLocks noGrp="1"/>
-          </p:cNvSpPr>
-          <p:nvPr>
-            <p:ph idx="1"/>
-          </p:nvPr>
-        </p:nvSpPr>
-        <p:spPr>
-          <a:xfrm>
-            <a:off x="838200" y="1825625"/>
-            <a:ext cx="7608376" cy="3859742"/>
-          </a:xfrm>
-        </p:spPr>
-        <p:txBody>
-          <a:bodyPr>
-            <a:normAutofit/>
-          </a:bodyPr>
-          <a:lstStyle/>
-          <a:p>
-            <a:pPr>
-              <a:lnSpc>
-                <a:spcPct val="150000"/>
-              </a:lnSpc>
-            </a:pPr>
-            <a:r>
-              <a:rPr lang="en-US" dirty="0"/>
-              <a:t>Higher education rates does correlate with increased life expectancy, but…</a:t>
-            </a:r>
-          </a:p>
-          <a:p>
-            <a:pPr lvl="1">
-              <a:lnSpc>
-                <a:spcPct val="150000"/>
-              </a:lnSpc>
-            </a:pPr>
-            <a:r>
-              <a:rPr lang="en-US" dirty="0"/>
-              <a:t>There is a difference when it comes to male and females.</a:t>
-            </a:r>
-          </a:p>
-          <a:p>
-            <a:pPr lvl="1">
-              <a:lnSpc>
-                <a:spcPct val="150000"/>
-              </a:lnSpc>
-            </a:pPr>
-            <a:r>
-              <a:rPr lang="en-US" dirty="0"/>
-              <a:t>The education rate between countries does have a slight influence on their life expectancy, especially at the higher rates.</a:t>
-            </a:r>
-          </a:p>
-          <a:p>
-            <a:pPr lvl="1">
-              <a:lnSpc>
-                <a:spcPct val="150000"/>
-              </a:lnSpc>
-            </a:pPr>
-            <a:endParaRPr lang="en-US" dirty="0"/>
           </a:p>
         </p:txBody>
       </p:sp>
       <p:pic>
         <p:nvPicPr>
-          <p:cNvPr id="1026" name="Picture 2" descr="Draw male and female gender symbols in iOS - Stack Overflow">
-            <a:extLst>
-              <a:ext uri="{FF2B5EF4-FFF2-40B4-BE49-F238E27FC236}">
-                <a16:creationId xmlns:a16="http://schemas.microsoft.com/office/drawing/2014/main" id="{C7D3BB0B-66DB-4EB3-AB57-B1DB92764823}"/>
+          <p:cNvPr id="5" name="Picture 4" descr="Chart, text, scatter chart&#10;&#10;Description automatically generated">
+            <a:extLst>
+              <a:ext uri="{FF2B5EF4-FFF2-40B4-BE49-F238E27FC236}">
+                <a16:creationId xmlns:a16="http://schemas.microsoft.com/office/drawing/2014/main" id="{0F025E06-4770-4D59-98AB-DC2ACA9AA1DB}"/>
               </a:ext>
             </a:extLst>
           </p:cNvPr>
           <p:cNvPicPr>
-            <a:picLocks noChangeAspect="1" noChangeArrowheads="1"/>
+            <a:picLocks noChangeAspect="1"/>
           </p:cNvPicPr>
           <p:nvPr/>
         </p:nvPicPr>
-        <p:blipFill>
-          <a:blip r:embed="rId2">
-            <a:extLst>
-              <a:ext uri="{28A0092B-C50C-407E-A947-70E740481C1C}">
-                <a14:useLocalDpi xmlns:a14="http://schemas.microsoft.com/office/drawing/2010/main" val="0"/>
-              </a:ext>
-            </a:extLst>
-          </a:blip>
-          <a:srcRect/>
-          <a:stretch>
-            <a:fillRect/>
-          </a:stretch>
+        <p:blipFill rotWithShape="1">
+          <a:blip r:embed="rId3"/>
+          <a:srcRect t="1371"/>
+          <a:stretch/>
         </p:blipFill>
-        <p:spPr bwMode="auto">
+        <p:spPr>
           <a:xfrm>
-            <a:off x="8525487" y="1970536"/>
-            <a:ext cx="1584574" cy="954034"/>
+            <a:off x="1367181" y="1690688"/>
+            <a:ext cx="9457637" cy="4802187"/>
           </a:xfrm>
           <a:prstGeom prst="rect">
             <a:avLst/>
           </a:prstGeom>
-          <a:noFill/>
-          <a:extLst>
-            <a:ext uri="{909E8E84-426E-40DD-AFC4-6F175D3DCCD1}">
-              <a14:hiddenFill xmlns:a14="http://schemas.microsoft.com/office/drawing/2010/main">
-                <a:solidFill>
-                  <a:srgbClr val="FFFFFF"/>
-                </a:solidFill>
-              </a14:hiddenFill>
-            </a:ext>
-          </a:extLst>
-        </p:spPr>
-      </p:pic>
-      <p:pic>
-        <p:nvPicPr>
-          <p:cNvPr id="1028" name="Picture 4" descr="Easy to read - The European Union | European Union">
-            <a:extLst>
-              <a:ext uri="{FF2B5EF4-FFF2-40B4-BE49-F238E27FC236}">
-                <a16:creationId xmlns:a16="http://schemas.microsoft.com/office/drawing/2014/main" id="{6FD683C1-221F-4BC8-B381-88D77D056D0A}"/>
-              </a:ext>
-            </a:extLst>
-          </p:cNvPr>
-          <p:cNvPicPr>
-            <a:picLocks noChangeAspect="1" noChangeArrowheads="1"/>
-          </p:cNvPicPr>
-          <p:nvPr/>
-        </p:nvPicPr>
-        <p:blipFill>
-          <a:blip r:embed="rId3">
-            <a:extLst>
-              <a:ext uri="{28A0092B-C50C-407E-A947-70E740481C1C}">
-                <a14:useLocalDpi xmlns:a14="http://schemas.microsoft.com/office/drawing/2010/main" val="0"/>
-              </a:ext>
-            </a:extLst>
-          </a:blip>
-          <a:srcRect/>
-          <a:stretch>
-            <a:fillRect/>
-          </a:stretch>
-        </p:blipFill>
-        <p:spPr bwMode="auto">
-          <a:xfrm>
-            <a:off x="8660566" y="3933431"/>
-            <a:ext cx="2124075" cy="2152650"/>
-          </a:xfrm>
-          <a:prstGeom prst="rect">
-            <a:avLst/>
-          </a:prstGeom>
-          <a:noFill/>
-          <a:extLst>
-            <a:ext uri="{909E8E84-426E-40DD-AFC4-6F175D3DCCD1}">
-              <a14:hiddenFill xmlns:a14="http://schemas.microsoft.com/office/drawing/2010/main">
-                <a:solidFill>
-                  <a:srgbClr val="FFFFFF"/>
-                </a:solidFill>
-              </a14:hiddenFill>
-            </a:ext>
-          </a:extLst>
         </p:spPr>
       </p:pic>
     </p:spTree>
     <p:extLst>
       <p:ext uri="{BB962C8B-B14F-4D97-AF65-F5344CB8AC3E}">
-        <p14:creationId xmlns:p14="http://schemas.microsoft.com/office/powerpoint/2010/main" val="1379012888"/>
+        <p14:creationId xmlns:p14="http://schemas.microsoft.com/office/powerpoint/2010/main" val="3838220639"/>
       </p:ext>
     </p:extLst>
   </p:cSld>
   <p:clrMapOvr>
     <a:masterClrMapping/>
   </p:clrMapOvr>
-  <p:timing>
-    <p:tnLst>
-      <p:par>
-        <p:cTn id="1" dur="indefinite" restart="never" nodeType="tmRoot">
-          <p:childTnLst>
-            <p:seq concurrent="1" nextAc="seek">
-              <p:cTn id="2" dur="indefinite" nodeType="mainSeq">
-                <p:childTnLst>
-                  <p:par>
-                    <p:cTn id="3" fill="hold">
-                      <p:stCondLst>
-                        <p:cond delay="indefinite"/>
-                      </p:stCondLst>
-                      <p:childTnLst>
-                        <p:par>
-                          <p:cTn id="4" fill="hold">
-                            <p:stCondLst>
-                              <p:cond delay="0"/>
-                            </p:stCondLst>
-                            <p:childTnLst>
-                              <p:par>
-                                <p:cTn id="5" presetID="1" presetClass="entr" presetSubtype="0" fill="hold" nodeType="clickEffect">
-                                  <p:stCondLst>
-                                    <p:cond delay="0"/>
-                                  </p:stCondLst>
-                                  <p:childTnLst>
-                                    <p:set>
-                                      <p:cBhvr>
-                                        <p:cTn id="6" dur="1" fill="hold">
-                                          <p:stCondLst>
-                                            <p:cond delay="0"/>
-                                          </p:stCondLst>
-                                        </p:cTn>
-                                        <p:tgtEl>
-                                          <p:spTgt spid="3">
-                                            <p:txEl>
-                                              <p:pRg st="0" end="0"/>
-                                            </p:txEl>
-                                          </p:spTgt>
-                                        </p:tgtEl>
-                                        <p:attrNameLst>
-                                          <p:attrName>style.visibility</p:attrName>
-                                        </p:attrNameLst>
-                                      </p:cBhvr>
-                                      <p:to>
-                                        <p:strVal val="visible"/>
-                                      </p:to>
-                                    </p:set>
-                                  </p:childTnLst>
-                                </p:cTn>
-                              </p:par>
-                            </p:childTnLst>
-                          </p:cTn>
-                        </p:par>
-                      </p:childTnLst>
-                    </p:cTn>
-                  </p:par>
-                  <p:par>
-                    <p:cTn id="7" fill="hold">
-                      <p:stCondLst>
-                        <p:cond delay="indefinite"/>
-                      </p:stCondLst>
-                      <p:childTnLst>
-                        <p:par>
-                          <p:cTn id="8" fill="hold">
-                            <p:stCondLst>
-                              <p:cond delay="0"/>
-                            </p:stCondLst>
-                            <p:childTnLst>
-                              <p:par>
-                                <p:cTn id="9" presetID="1" presetClass="entr" presetSubtype="0" fill="hold" nodeType="clickEffect">
-                                  <p:stCondLst>
-                                    <p:cond delay="0"/>
-                                  </p:stCondLst>
-                                  <p:childTnLst>
-                                    <p:set>
-                                      <p:cBhvr>
-                                        <p:cTn id="10" dur="1" fill="hold">
-                                          <p:stCondLst>
-                                            <p:cond delay="0"/>
-                                          </p:stCondLst>
-                                        </p:cTn>
-                                        <p:tgtEl>
-                                          <p:spTgt spid="3">
-                                            <p:txEl>
-                                              <p:pRg st="1" end="1"/>
-                                            </p:txEl>
-                                          </p:spTgt>
-                                        </p:tgtEl>
-                                        <p:attrNameLst>
-                                          <p:attrName>style.visibility</p:attrName>
-                                        </p:attrNameLst>
-                                      </p:cBhvr>
-                                      <p:to>
-                                        <p:strVal val="visible"/>
-                                      </p:to>
-                                    </p:set>
-                                  </p:childTnLst>
-                                </p:cTn>
-                              </p:par>
-                            </p:childTnLst>
-                          </p:cTn>
-                        </p:par>
-                      </p:childTnLst>
-                    </p:cTn>
-                  </p:par>
-                  <p:par>
-                    <p:cTn id="11" fill="hold">
-                      <p:stCondLst>
-                        <p:cond delay="indefinite"/>
-                      </p:stCondLst>
-                      <p:childTnLst>
-                        <p:par>
-                          <p:cTn id="12" fill="hold">
-                            <p:stCondLst>
-                              <p:cond delay="0"/>
-                            </p:stCondLst>
-                            <p:childTnLst>
-                              <p:par>
-                                <p:cTn id="13" presetID="1" presetClass="entr" presetSubtype="0" fill="hold" nodeType="clickEffect">
-                                  <p:stCondLst>
-                                    <p:cond delay="0"/>
-                                  </p:stCondLst>
-                                  <p:childTnLst>
-                                    <p:set>
-                                      <p:cBhvr>
-                                        <p:cTn id="14" dur="1" fill="hold">
-                                          <p:stCondLst>
-                                            <p:cond delay="0"/>
-                                          </p:stCondLst>
-                                        </p:cTn>
-                                        <p:tgtEl>
-                                          <p:spTgt spid="1026"/>
-                                        </p:tgtEl>
-                                        <p:attrNameLst>
-                                          <p:attrName>style.visibility</p:attrName>
-                                        </p:attrNameLst>
-                                      </p:cBhvr>
-                                      <p:to>
-                                        <p:strVal val="visible"/>
-                                      </p:to>
-                                    </p:set>
-                                  </p:childTnLst>
-                                </p:cTn>
-                              </p:par>
-                            </p:childTnLst>
-                          </p:cTn>
-                        </p:par>
-                      </p:childTnLst>
-                    </p:cTn>
-                  </p:par>
-                  <p:par>
-                    <p:cTn id="15" fill="hold">
-                      <p:stCondLst>
-                        <p:cond delay="indefinite"/>
-                      </p:stCondLst>
-                      <p:childTnLst>
-                        <p:par>
-                          <p:cTn id="16" fill="hold">
-                            <p:stCondLst>
-                              <p:cond delay="0"/>
-                            </p:stCondLst>
-                            <p:childTnLst>
-                              <p:par>
-                                <p:cTn id="17" presetID="1" presetClass="entr" presetSubtype="0" fill="hold" nodeType="clickEffect">
-                                  <p:stCondLst>
-                                    <p:cond delay="0"/>
-                                  </p:stCondLst>
-                                  <p:childTnLst>
-                                    <p:set>
-                                      <p:cBhvr>
-                                        <p:cTn id="18" dur="1" fill="hold">
-                                          <p:stCondLst>
-                                            <p:cond delay="0"/>
-                                          </p:stCondLst>
-                                        </p:cTn>
-                                        <p:tgtEl>
-                                          <p:spTgt spid="3">
-                                            <p:txEl>
-                                              <p:pRg st="2" end="2"/>
-                                            </p:txEl>
-                                          </p:spTgt>
-                                        </p:tgtEl>
-                                        <p:attrNameLst>
-                                          <p:attrName>style.visibility</p:attrName>
-                                        </p:attrNameLst>
-                                      </p:cBhvr>
-                                      <p:to>
-                                        <p:strVal val="visible"/>
-                                      </p:to>
-                                    </p:set>
-                                  </p:childTnLst>
-                                </p:cTn>
-                              </p:par>
-                            </p:childTnLst>
-                          </p:cTn>
-                        </p:par>
-                      </p:childTnLst>
-                    </p:cTn>
-                  </p:par>
-                  <p:par>
-                    <p:cTn id="19" fill="hold">
-                      <p:stCondLst>
-                        <p:cond delay="indefinite"/>
-                      </p:stCondLst>
-                      <p:childTnLst>
-                        <p:par>
-                          <p:cTn id="20" fill="hold">
-                            <p:stCondLst>
-                              <p:cond delay="0"/>
-                            </p:stCondLst>
-                            <p:childTnLst>
-                              <p:par>
-                                <p:cTn id="21" presetID="1" presetClass="entr" presetSubtype="0" fill="hold" nodeType="clickEffect">
-                                  <p:stCondLst>
-                                    <p:cond delay="0"/>
-                                  </p:stCondLst>
-                                  <p:childTnLst>
-                                    <p:set>
-                                      <p:cBhvr>
-                                        <p:cTn id="22" dur="1" fill="hold">
-                                          <p:stCondLst>
-                                            <p:cond delay="0"/>
-                                          </p:stCondLst>
-                                        </p:cTn>
-                                        <p:tgtEl>
-                                          <p:spTgt spid="1028"/>
-                                        </p:tgtEl>
-                                        <p:attrNameLst>
-                                          <p:attrName>style.visibility</p:attrName>
-                                        </p:attrNameLst>
-                                      </p:cBhvr>
-                                      <p:to>
-                                        <p:strVal val="visible"/>
-                                      </p:to>
-                                    </p:set>
-                                  </p:childTnLst>
-                                </p:cTn>
-                              </p:par>
-                            </p:childTnLst>
-                          </p:cTn>
-                        </p:par>
-                      </p:childTnLst>
-                    </p:cTn>
-                  </p:par>
-                </p:childTnLst>
-              </p:cTn>
-              <p:prevCondLst>
-                <p:cond evt="onPrev" delay="0">
-                  <p:tgtEl>
-                    <p:sldTgt/>
-                  </p:tgtEl>
-                </p:cond>
-              </p:prevCondLst>
-              <p:nextCondLst>
-                <p:cond evt="onNext" delay="0">
-                  <p:tgtEl>
-                    <p:sldTgt/>
-                  </p:tgtEl>
-                </p:cond>
-              </p:nextCondLst>
-            </p:seq>
-          </p:childTnLst>
-        </p:cTn>
-      </p:par>
-    </p:tnLst>
-  </p:timing>
+</p:sld>
+</file>
+
+<file path=ppt/slides/slide5.xml><?xml version="1.0" encoding="utf-8"?>
+<p:sld xmlns:a="http://schemas.openxmlformats.org/drawingml/2006/main" xmlns:r="http://schemas.openxmlformats.org/officeDocument/2006/relationships" xmlns:p="http://schemas.openxmlformats.org/presentationml/2006/main">
+  <p:cSld>
+    <p:spTree>
+      <p:nvGrpSpPr>
+        <p:cNvPr id="1" name=""/>
+        <p:cNvGrpSpPr/>
+        <p:nvPr/>
+      </p:nvGrpSpPr>
+      <p:grpSpPr>
+        <a:xfrm>
+          <a:off x="0" y="0"/>
+          <a:ext cx="0" cy="0"/>
+          <a:chOff x="0" y="0"/>
+          <a:chExt cx="0" cy="0"/>
+        </a:xfrm>
+      </p:grpSpPr>
+      <p:sp>
+        <p:nvSpPr>
+          <p:cNvPr id="2" name="Title 1">
+            <a:extLst>
+              <a:ext uri="{FF2B5EF4-FFF2-40B4-BE49-F238E27FC236}">
+                <a16:creationId xmlns:a16="http://schemas.microsoft.com/office/drawing/2014/main" id="{6C0944A9-93FA-43EF-A3DB-9DEE6F35CE4A}"/>
+              </a:ext>
+            </a:extLst>
+          </p:cNvPr>
+          <p:cNvSpPr>
+            <a:spLocks noGrp="1"/>
+          </p:cNvSpPr>
+          <p:nvPr>
+            <p:ph type="title"/>
+          </p:nvPr>
+        </p:nvSpPr>
+        <p:spPr/>
+        <p:txBody>
+          <a:bodyPr/>
+          <a:lstStyle/>
+          <a:p>
+            <a:r>
+              <a:rPr lang="en-US" dirty="0"/>
+              <a:t>Data in Previous Slide with High Education Rates (&gt;40% ED5-8) and Lower Life Expectancy (77 years)</a:t>
+            </a:r>
+          </a:p>
+        </p:txBody>
+      </p:sp>
+      <p:pic>
+        <p:nvPicPr>
+          <p:cNvPr id="4" name="Picture 3" descr="Graphical user interface&#10;&#10;Description automatically generated with medium confidence">
+            <a:extLst>
+              <a:ext uri="{FF2B5EF4-FFF2-40B4-BE49-F238E27FC236}">
+                <a16:creationId xmlns:a16="http://schemas.microsoft.com/office/drawing/2014/main" id="{5C5D309B-02F4-4C12-8C9E-5C12C652B498}"/>
+              </a:ext>
+            </a:extLst>
+          </p:cNvPr>
+          <p:cNvPicPr>
+            <a:picLocks noChangeAspect="1"/>
+          </p:cNvPicPr>
+          <p:nvPr/>
+        </p:nvPicPr>
+        <p:blipFill rotWithShape="1">
+          <a:blip r:embed="rId3"/>
+          <a:srcRect l="14336"/>
+          <a:stretch/>
+        </p:blipFill>
+        <p:spPr>
+          <a:xfrm>
+            <a:off x="1040743" y="2143760"/>
+            <a:ext cx="9542158" cy="2152136"/>
+          </a:xfrm>
+          <a:prstGeom prst="rect">
+            <a:avLst/>
+          </a:prstGeom>
+        </p:spPr>
+      </p:pic>
+    </p:spTree>
+    <p:extLst>
+      <p:ext uri="{BB962C8B-B14F-4D97-AF65-F5344CB8AC3E}">
+        <p14:creationId xmlns:p14="http://schemas.microsoft.com/office/powerpoint/2010/main" val="718411913"/>
+      </p:ext>
+    </p:extLst>
+  </p:cSld>
+  <p:clrMapOvr>
+    <a:masterClrMapping/>
+  </p:clrMapOvr>
+</p:sld>
+</file>
+
+<file path=ppt/slides/slide6.xml><?xml version="1.0" encoding="utf-8"?>
+<p:sld xmlns:a="http://schemas.openxmlformats.org/drawingml/2006/main" xmlns:r="http://schemas.openxmlformats.org/officeDocument/2006/relationships" xmlns:p="http://schemas.openxmlformats.org/presentationml/2006/main">
+  <p:cSld>
+    <p:spTree>
+      <p:nvGrpSpPr>
+        <p:cNvPr id="1" name=""/>
+        <p:cNvGrpSpPr/>
+        <p:nvPr/>
+      </p:nvGrpSpPr>
+      <p:grpSpPr>
+        <a:xfrm>
+          <a:off x="0" y="0"/>
+          <a:ext cx="0" cy="0"/>
+          <a:chOff x="0" y="0"/>
+          <a:chExt cx="0" cy="0"/>
+        </a:xfrm>
+      </p:grpSpPr>
+      <p:sp>
+        <p:nvSpPr>
+          <p:cNvPr id="2" name="Title 1">
+            <a:extLst>
+              <a:ext uri="{FF2B5EF4-FFF2-40B4-BE49-F238E27FC236}">
+                <a16:creationId xmlns:a16="http://schemas.microsoft.com/office/drawing/2014/main" id="{6C0944A9-93FA-43EF-A3DB-9DEE6F35CE4A}"/>
+              </a:ext>
+            </a:extLst>
+          </p:cNvPr>
+          <p:cNvSpPr>
+            <a:spLocks noGrp="1"/>
+          </p:cNvSpPr>
+          <p:nvPr>
+            <p:ph type="title"/>
+          </p:nvPr>
+        </p:nvSpPr>
+        <p:spPr/>
+        <p:txBody>
+          <a:bodyPr/>
+          <a:lstStyle/>
+          <a:p>
+            <a:r>
+              <a:rPr lang="en-US" dirty="0"/>
+              <a:t>Correlation between Life Expectancy and Education (ED5-8) for Lithuania 2019</a:t>
+            </a:r>
+          </a:p>
+        </p:txBody>
+      </p:sp>
+      <p:pic>
+        <p:nvPicPr>
+          <p:cNvPr id="4" name="Picture 3" descr="Chart, scatter chart&#10;&#10;Description automatically generated">
+            <a:extLst>
+              <a:ext uri="{FF2B5EF4-FFF2-40B4-BE49-F238E27FC236}">
+                <a16:creationId xmlns:a16="http://schemas.microsoft.com/office/drawing/2014/main" id="{03120CF2-A29B-4A4F-A7ED-E7018CFE409E}"/>
+              </a:ext>
+            </a:extLst>
+          </p:cNvPr>
+          <p:cNvPicPr>
+            <a:picLocks noChangeAspect="1"/>
+          </p:cNvPicPr>
+          <p:nvPr/>
+        </p:nvPicPr>
+        <p:blipFill>
+          <a:blip r:embed="rId3"/>
+          <a:stretch>
+            <a:fillRect/>
+          </a:stretch>
+        </p:blipFill>
+        <p:spPr>
+          <a:xfrm>
+            <a:off x="1082040" y="1690688"/>
+            <a:ext cx="8988691" cy="4639079"/>
+          </a:xfrm>
+          <a:prstGeom prst="rect">
+            <a:avLst/>
+          </a:prstGeom>
+        </p:spPr>
+      </p:pic>
+    </p:spTree>
+    <p:extLst>
+      <p:ext uri="{BB962C8B-B14F-4D97-AF65-F5344CB8AC3E}">
+        <p14:creationId xmlns:p14="http://schemas.microsoft.com/office/powerpoint/2010/main" val="841579074"/>
+      </p:ext>
+    </p:extLst>
+  </p:cSld>
+  <p:clrMapOvr>
+    <a:masterClrMapping/>
+  </p:clrMapOvr>
+</p:sld>
+</file>
+
+<file path=ppt/slides/slide7.xml><?xml version="1.0" encoding="utf-8"?>
+<p:sld xmlns:a="http://schemas.openxmlformats.org/drawingml/2006/main" xmlns:r="http://schemas.openxmlformats.org/officeDocument/2006/relationships" xmlns:p="http://schemas.openxmlformats.org/presentationml/2006/main">
+  <p:cSld>
+    <p:spTree>
+      <p:nvGrpSpPr>
+        <p:cNvPr id="1" name=""/>
+        <p:cNvGrpSpPr/>
+        <p:nvPr/>
+      </p:nvGrpSpPr>
+      <p:grpSpPr>
+        <a:xfrm>
+          <a:off x="0" y="0"/>
+          <a:ext cx="0" cy="0"/>
+          <a:chOff x="0" y="0"/>
+          <a:chExt cx="0" cy="0"/>
+        </a:xfrm>
+      </p:grpSpPr>
+      <p:sp>
+        <p:nvSpPr>
+          <p:cNvPr id="2" name="Title 1">
+            <a:extLst>
+              <a:ext uri="{FF2B5EF4-FFF2-40B4-BE49-F238E27FC236}">
+                <a16:creationId xmlns:a16="http://schemas.microsoft.com/office/drawing/2014/main" id="{6C0944A9-93FA-43EF-A3DB-9DEE6F35CE4A}"/>
+              </a:ext>
+            </a:extLst>
+          </p:cNvPr>
+          <p:cNvSpPr>
+            <a:spLocks noGrp="1"/>
+          </p:cNvSpPr>
+          <p:nvPr>
+            <p:ph type="title"/>
+          </p:nvPr>
+        </p:nvSpPr>
+        <p:spPr/>
+        <p:txBody>
+          <a:bodyPr/>
+          <a:lstStyle/>
+          <a:p>
+            <a:r>
+              <a:rPr lang="en-US" dirty="0" err="1"/>
+              <a:t>Chloropleth</a:t>
+            </a:r>
+            <a:r>
+              <a:rPr lang="en-US" dirty="0"/>
+              <a:t> Map of Life Expectancy for European Union Countries</a:t>
+            </a:r>
+          </a:p>
+        </p:txBody>
+      </p:sp>
+      <p:pic>
+        <p:nvPicPr>
+          <p:cNvPr id="4" name="Picture 3" descr="A picture containing text&#10;&#10;Description automatically generated">
+            <a:extLst>
+              <a:ext uri="{FF2B5EF4-FFF2-40B4-BE49-F238E27FC236}">
+                <a16:creationId xmlns:a16="http://schemas.microsoft.com/office/drawing/2014/main" id="{1A4831F6-5B1E-440C-8FDB-53588348E3CB}"/>
+              </a:ext>
+            </a:extLst>
+          </p:cNvPr>
+          <p:cNvPicPr>
+            <a:picLocks noChangeAspect="1"/>
+          </p:cNvPicPr>
+          <p:nvPr/>
+        </p:nvPicPr>
+        <p:blipFill>
+          <a:blip r:embed="rId3"/>
+          <a:stretch>
+            <a:fillRect/>
+          </a:stretch>
+        </p:blipFill>
+        <p:spPr>
+          <a:xfrm>
+            <a:off x="1219200" y="2646191"/>
+            <a:ext cx="2150647" cy="3240601"/>
+          </a:xfrm>
+          <a:prstGeom prst="rect">
+            <a:avLst/>
+          </a:prstGeom>
+        </p:spPr>
+      </p:pic>
+      <p:pic>
+        <p:nvPicPr>
+          <p:cNvPr id="6" name="Picture 5" descr="A map of the world&#10;&#10;Description automatically generated with medium confidence">
+            <a:extLst>
+              <a:ext uri="{FF2B5EF4-FFF2-40B4-BE49-F238E27FC236}">
+                <a16:creationId xmlns:a16="http://schemas.microsoft.com/office/drawing/2014/main" id="{E9335B6B-74B9-439F-8E70-E0EE8E4058C3}"/>
+              </a:ext>
+            </a:extLst>
+          </p:cNvPr>
+          <p:cNvPicPr>
+            <a:picLocks noChangeAspect="1"/>
+          </p:cNvPicPr>
+          <p:nvPr/>
+        </p:nvPicPr>
+        <p:blipFill>
+          <a:blip r:embed="rId4"/>
+          <a:stretch>
+            <a:fillRect/>
+          </a:stretch>
+        </p:blipFill>
+        <p:spPr>
+          <a:xfrm>
+            <a:off x="3915509" y="1740480"/>
+            <a:ext cx="5744306" cy="4570739"/>
+          </a:xfrm>
+          <a:prstGeom prst="rect">
+            <a:avLst/>
+          </a:prstGeom>
+        </p:spPr>
+      </p:pic>
+    </p:spTree>
+    <p:extLst>
+      <p:ext uri="{BB962C8B-B14F-4D97-AF65-F5344CB8AC3E}">
+        <p14:creationId xmlns:p14="http://schemas.microsoft.com/office/powerpoint/2010/main" val="2997993616"/>
+      </p:ext>
+    </p:extLst>
+  </p:cSld>
+  <p:clrMapOvr>
+    <a:masterClrMapping/>
+  </p:clrMapOvr>
+</p:sld>
+</file>
+
+<file path=ppt/slides/slide8.xml><?xml version="1.0" encoding="utf-8"?>
+<p:sld xmlns:a="http://schemas.openxmlformats.org/drawingml/2006/main" xmlns:r="http://schemas.openxmlformats.org/officeDocument/2006/relationships" xmlns:p="http://schemas.openxmlformats.org/presentationml/2006/main">
+  <p:cSld>
+    <p:spTree>
+      <p:nvGrpSpPr>
+        <p:cNvPr id="1" name=""/>
+        <p:cNvGrpSpPr/>
+        <p:nvPr/>
+      </p:nvGrpSpPr>
+      <p:grpSpPr>
+        <a:xfrm>
+          <a:off x="0" y="0"/>
+          <a:ext cx="0" cy="0"/>
+          <a:chOff x="0" y="0"/>
+          <a:chExt cx="0" cy="0"/>
+        </a:xfrm>
+      </p:grpSpPr>
+      <p:sp>
+        <p:nvSpPr>
+          <p:cNvPr id="2" name="Title 1">
+            <a:extLst>
+              <a:ext uri="{FF2B5EF4-FFF2-40B4-BE49-F238E27FC236}">
+                <a16:creationId xmlns:a16="http://schemas.microsoft.com/office/drawing/2014/main" id="{6C0944A9-93FA-43EF-A3DB-9DEE6F35CE4A}"/>
+              </a:ext>
+            </a:extLst>
+          </p:cNvPr>
+          <p:cNvSpPr>
+            <a:spLocks noGrp="1"/>
+          </p:cNvSpPr>
+          <p:nvPr>
+            <p:ph type="title"/>
+          </p:nvPr>
+        </p:nvSpPr>
+        <p:spPr/>
+        <p:txBody>
+          <a:bodyPr/>
+          <a:lstStyle/>
+          <a:p>
+            <a:r>
+              <a:rPr lang="en-US" dirty="0"/>
+              <a:t>Life Expectancy by Year</a:t>
+            </a:r>
+          </a:p>
+        </p:txBody>
+      </p:sp>
+      <p:pic>
+        <p:nvPicPr>
+          <p:cNvPr id="4" name="Picture 3" descr="Chart, line chart&#10;&#10;Description automatically generated">
+            <a:extLst>
+              <a:ext uri="{FF2B5EF4-FFF2-40B4-BE49-F238E27FC236}">
+                <a16:creationId xmlns:a16="http://schemas.microsoft.com/office/drawing/2014/main" id="{07FE90DC-3277-4C30-949E-80A408939F35}"/>
+              </a:ext>
+            </a:extLst>
+          </p:cNvPr>
+          <p:cNvPicPr>
+            <a:picLocks noChangeAspect="1"/>
+          </p:cNvPicPr>
+          <p:nvPr/>
+        </p:nvPicPr>
+        <p:blipFill>
+          <a:blip r:embed="rId3">
+            <a:extLst>
+              <a:ext uri="{28A0092B-C50C-407E-A947-70E740481C1C}">
+                <a14:useLocalDpi xmlns:a14="http://schemas.microsoft.com/office/drawing/2010/main" val="0"/>
+              </a:ext>
+            </a:extLst>
+          </a:blip>
+          <a:stretch>
+            <a:fillRect/>
+          </a:stretch>
+        </p:blipFill>
+        <p:spPr>
+          <a:xfrm>
+            <a:off x="2526224" y="1690688"/>
+            <a:ext cx="5539863" cy="4888114"/>
+          </a:xfrm>
+          <a:prstGeom prst="rect">
+            <a:avLst/>
+          </a:prstGeom>
+        </p:spPr>
+      </p:pic>
+    </p:spTree>
+    <p:extLst>
+      <p:ext uri="{BB962C8B-B14F-4D97-AF65-F5344CB8AC3E}">
+        <p14:creationId xmlns:p14="http://schemas.microsoft.com/office/powerpoint/2010/main" val="2150094559"/>
+      </p:ext>
+    </p:extLst>
+  </p:cSld>
+  <p:clrMapOvr>
+    <a:masterClrMapping/>
+  </p:clrMapOvr>
+</p:sld>
+</file>
+
+<file path=ppt/slides/slide9.xml><?xml version="1.0" encoding="utf-8"?>
+<p:sld xmlns:a="http://schemas.openxmlformats.org/drawingml/2006/main" xmlns:r="http://schemas.openxmlformats.org/officeDocument/2006/relationships" xmlns:p="http://schemas.openxmlformats.org/presentationml/2006/main">
+  <p:cSld>
+    <p:spTree>
+      <p:nvGrpSpPr>
+        <p:cNvPr id="1" name=""/>
+        <p:cNvGrpSpPr/>
+        <p:nvPr/>
+      </p:nvGrpSpPr>
+      <p:grpSpPr>
+        <a:xfrm>
+          <a:off x="0" y="0"/>
+          <a:ext cx="0" cy="0"/>
+          <a:chOff x="0" y="0"/>
+          <a:chExt cx="0" cy="0"/>
+        </a:xfrm>
+      </p:grpSpPr>
+      <p:sp>
+        <p:nvSpPr>
+          <p:cNvPr id="2" name="Title 1">
+            <a:extLst>
+              <a:ext uri="{FF2B5EF4-FFF2-40B4-BE49-F238E27FC236}">
+                <a16:creationId xmlns:a16="http://schemas.microsoft.com/office/drawing/2014/main" id="{6C0944A9-93FA-43EF-A3DB-9DEE6F35CE4A}"/>
+              </a:ext>
+            </a:extLst>
+          </p:cNvPr>
+          <p:cNvSpPr>
+            <a:spLocks noGrp="1"/>
+          </p:cNvSpPr>
+          <p:nvPr>
+            <p:ph type="title"/>
+          </p:nvPr>
+        </p:nvSpPr>
+        <p:spPr/>
+        <p:txBody>
+          <a:bodyPr/>
+          <a:lstStyle/>
+          <a:p>
+            <a:r>
+              <a:rPr lang="en-US" dirty="0"/>
+              <a:t>Violin Plots of Life Expectancy by Year</a:t>
+            </a:r>
+          </a:p>
+        </p:txBody>
+      </p:sp>
+      <p:pic>
+        <p:nvPicPr>
+          <p:cNvPr id="8" name="Picture 7" descr="Chart&#10;&#10;Description automatically generated">
+            <a:extLst>
+              <a:ext uri="{FF2B5EF4-FFF2-40B4-BE49-F238E27FC236}">
+                <a16:creationId xmlns:a16="http://schemas.microsoft.com/office/drawing/2014/main" id="{2F33DE95-5DBA-4804-88BD-5462F8321CC8}"/>
+              </a:ext>
+            </a:extLst>
+          </p:cNvPr>
+          <p:cNvPicPr>
+            <a:picLocks noChangeAspect="1"/>
+          </p:cNvPicPr>
+          <p:nvPr/>
+        </p:nvPicPr>
+        <p:blipFill>
+          <a:blip r:embed="rId3">
+            <a:extLst>
+              <a:ext uri="{28A0092B-C50C-407E-A947-70E740481C1C}">
+                <a14:useLocalDpi xmlns:a14="http://schemas.microsoft.com/office/drawing/2010/main" val="0"/>
+              </a:ext>
+            </a:extLst>
+          </a:blip>
+          <a:stretch>
+            <a:fillRect/>
+          </a:stretch>
+        </p:blipFill>
+        <p:spPr>
+          <a:xfrm>
+            <a:off x="0" y="1397000"/>
+            <a:ext cx="12192000" cy="4064000"/>
+          </a:xfrm>
+          <a:prstGeom prst="rect">
+            <a:avLst/>
+          </a:prstGeom>
+        </p:spPr>
+      </p:pic>
+    </p:spTree>
+    <p:extLst>
+      <p:ext uri="{BB962C8B-B14F-4D97-AF65-F5344CB8AC3E}">
+        <p14:creationId xmlns:p14="http://schemas.microsoft.com/office/powerpoint/2010/main" val="1330968395"/>
+      </p:ext>
+    </p:extLst>
+  </p:cSld>
+  <p:clrMapOvr>
+    <a:masterClrMapping/>
+  </p:clrMapOvr>
 </p:sld>
 </file>
 
@@ -8602,4 +10952,299 @@
     </a:ext>
   </a:extLst>
 </a:theme>
+</file>
+
+<file path=ppt/theme/theme2.xml><?xml version="1.0" encoding="utf-8"?>
+<a:theme xmlns:a="http://schemas.openxmlformats.org/drawingml/2006/main" name="Office Theme">
+  <a:themeElements>
+    <a:clrScheme name="Office">
+      <a:dk1>
+        <a:sysClr val="windowText" lastClr="000000"/>
+      </a:dk1>
+      <a:lt1>
+        <a:sysClr val="window" lastClr="FFFFFF"/>
+      </a:lt1>
+      <a:dk2>
+        <a:srgbClr val="44546A"/>
+      </a:dk2>
+      <a:lt2>
+        <a:srgbClr val="E7E6E6"/>
+      </a:lt2>
+      <a:accent1>
+        <a:srgbClr val="4472C4"/>
+      </a:accent1>
+      <a:accent2>
+        <a:srgbClr val="ED7D31"/>
+      </a:accent2>
+      <a:accent3>
+        <a:srgbClr val="A5A5A5"/>
+      </a:accent3>
+      <a:accent4>
+        <a:srgbClr val="FFC000"/>
+      </a:accent4>
+      <a:accent5>
+        <a:srgbClr val="5B9BD5"/>
+      </a:accent5>
+      <a:accent6>
+        <a:srgbClr val="70AD47"/>
+      </a:accent6>
+      <a:hlink>
+        <a:srgbClr val="0563C1"/>
+      </a:hlink>
+      <a:folHlink>
+        <a:srgbClr val="954F72"/>
+      </a:folHlink>
+    </a:clrScheme>
+    <a:fontScheme name="Office">
+      <a:majorFont>
+        <a:latin typeface="Calibri Light" panose="020F0302020204030204"/>
+        <a:ea typeface=""/>
+        <a:cs typeface=""/>
+        <a:font script="Jpan" typeface="游ゴシック Light"/>
+        <a:font script="Hang" typeface="맑은 고딕"/>
+        <a:font script="Hans" typeface="等线 Light"/>
+        <a:font script="Hant" typeface="新細明體"/>
+        <a:font script="Arab" typeface="Times New Roman"/>
+        <a:font script="Hebr" typeface="Times New Roman"/>
+        <a:font script="Thai" typeface="Angsana New"/>
+        <a:font script="Ethi" typeface="Nyala"/>
+        <a:font script="Beng" typeface="Vrinda"/>
+        <a:font script="Gujr" typeface="Shruti"/>
+        <a:font script="Khmr" typeface="MoolBoran"/>
+        <a:font script="Knda" typeface="Tunga"/>
+        <a:font script="Guru" typeface="Raavi"/>
+        <a:font script="Cans" typeface="Euphemia"/>
+        <a:font script="Cher" typeface="Plantagenet Cherokee"/>
+        <a:font script="Yiii" typeface="Microsoft Yi Baiti"/>
+        <a:font script="Tibt" typeface="Microsoft Himalaya"/>
+        <a:font script="Thaa" typeface="MV Boli"/>
+        <a:font script="Deva" typeface="Mangal"/>
+        <a:font script="Telu" typeface="Gautami"/>
+        <a:font script="Taml" typeface="Latha"/>
+        <a:font script="Syrc" typeface="Estrangelo Edessa"/>
+        <a:font script="Orya" typeface="Kalinga"/>
+        <a:font script="Mlym" typeface="Kartika"/>
+        <a:font script="Laoo" typeface="DokChampa"/>
+        <a:font script="Sinh" typeface="Iskoola Pota"/>
+        <a:font script="Mong" typeface="Mongolian Baiti"/>
+        <a:font script="Viet" typeface="Times New Roman"/>
+        <a:font script="Uigh" typeface="Microsoft Uighur"/>
+        <a:font script="Geor" typeface="Sylfaen"/>
+        <a:font script="Armn" typeface="Arial"/>
+        <a:font script="Bugi" typeface="Leelawadee UI"/>
+        <a:font script="Bopo" typeface="Microsoft JhengHei"/>
+        <a:font script="Java" typeface="Javanese Text"/>
+        <a:font script="Lisu" typeface="Segoe UI"/>
+        <a:font script="Mymr" typeface="Myanmar Text"/>
+        <a:font script="Nkoo" typeface="Ebrima"/>
+        <a:font script="Olck" typeface="Nirmala UI"/>
+        <a:font script="Osma" typeface="Ebrima"/>
+        <a:font script="Phag" typeface="Phagspa"/>
+        <a:font script="Syrn" typeface="Estrangelo Edessa"/>
+        <a:font script="Syrj" typeface="Estrangelo Edessa"/>
+        <a:font script="Syre" typeface="Estrangelo Edessa"/>
+        <a:font script="Sora" typeface="Nirmala UI"/>
+        <a:font script="Tale" typeface="Microsoft Tai Le"/>
+        <a:font script="Talu" typeface="Microsoft New Tai Lue"/>
+        <a:font script="Tfng" typeface="Ebrima"/>
+      </a:majorFont>
+      <a:minorFont>
+        <a:latin typeface="Calibri" panose="020F0502020204030204"/>
+        <a:ea typeface=""/>
+        <a:cs typeface=""/>
+        <a:font script="Jpan" typeface="游ゴシック"/>
+        <a:font script="Hang" typeface="맑은 고딕"/>
+        <a:font script="Hans" typeface="等线"/>
+        <a:font script="Hant" typeface="新細明體"/>
+        <a:font script="Arab" typeface="Arial"/>
+        <a:font script="Hebr" typeface="Arial"/>
+        <a:font script="Thai" typeface="Cordia New"/>
+        <a:font script="Ethi" typeface="Nyala"/>
+        <a:font script="Beng" typeface="Vrinda"/>
+        <a:font script="Gujr" typeface="Shruti"/>
+        <a:font script="Khmr" typeface="DaunPenh"/>
+        <a:font script="Knda" typeface="Tunga"/>
+        <a:font script="Guru" typeface="Raavi"/>
+        <a:font script="Cans" typeface="Euphemia"/>
+        <a:font script="Cher" typeface="Plantagenet Cherokee"/>
+        <a:font script="Yiii" typeface="Microsoft Yi Baiti"/>
+        <a:font script="Tibt" typeface="Microsoft Himalaya"/>
+        <a:font script="Thaa" typeface="MV Boli"/>
+        <a:font script="Deva" typeface="Mangal"/>
+        <a:font script="Telu" typeface="Gautami"/>
+        <a:font script="Taml" typeface="Latha"/>
+        <a:font script="Syrc" typeface="Estrangelo Edessa"/>
+        <a:font script="Orya" typeface="Kalinga"/>
+        <a:font script="Mlym" typeface="Kartika"/>
+        <a:font script="Laoo" typeface="DokChampa"/>
+        <a:font script="Sinh" typeface="Iskoola Pota"/>
+        <a:font script="Mong" typeface="Mongolian Baiti"/>
+        <a:font script="Viet" typeface="Arial"/>
+        <a:font script="Uigh" typeface="Microsoft Uighur"/>
+        <a:font script="Geor" typeface="Sylfaen"/>
+        <a:font script="Armn" typeface="Arial"/>
+        <a:font script="Bugi" typeface="Leelawadee UI"/>
+        <a:font script="Bopo" typeface="Microsoft JhengHei"/>
+        <a:font script="Java" typeface="Javanese Text"/>
+        <a:font script="Lisu" typeface="Segoe UI"/>
+        <a:font script="Mymr" typeface="Myanmar Text"/>
+        <a:font script="Nkoo" typeface="Ebrima"/>
+        <a:font script="Olck" typeface="Nirmala UI"/>
+        <a:font script="Osma" typeface="Ebrima"/>
+        <a:font script="Phag" typeface="Phagspa"/>
+        <a:font script="Syrn" typeface="Estrangelo Edessa"/>
+        <a:font script="Syrj" typeface="Estrangelo Edessa"/>
+        <a:font script="Syre" typeface="Estrangelo Edessa"/>
+        <a:font script="Sora" typeface="Nirmala UI"/>
+        <a:font script="Tale" typeface="Microsoft Tai Le"/>
+        <a:font script="Talu" typeface="Microsoft New Tai Lue"/>
+        <a:font script="Tfng" typeface="Ebrima"/>
+      </a:minorFont>
+    </a:fontScheme>
+    <a:fmtScheme name="Office">
+      <a:fillStyleLst>
+        <a:solidFill>
+          <a:schemeClr val="phClr"/>
+        </a:solidFill>
+        <a:gradFill rotWithShape="1">
+          <a:gsLst>
+            <a:gs pos="0">
+              <a:schemeClr val="phClr">
+                <a:lumMod val="110000"/>
+                <a:satMod val="105000"/>
+                <a:tint val="67000"/>
+              </a:schemeClr>
+            </a:gs>
+            <a:gs pos="50000">
+              <a:schemeClr val="phClr">
+                <a:lumMod val="105000"/>
+                <a:satMod val="103000"/>
+                <a:tint val="73000"/>
+              </a:schemeClr>
+            </a:gs>
+            <a:gs pos="100000">
+              <a:schemeClr val="phClr">
+                <a:lumMod val="105000"/>
+                <a:satMod val="109000"/>
+                <a:tint val="81000"/>
+              </a:schemeClr>
+            </a:gs>
+          </a:gsLst>
+          <a:lin ang="5400000" scaled="0"/>
+        </a:gradFill>
+        <a:gradFill rotWithShape="1">
+          <a:gsLst>
+            <a:gs pos="0">
+              <a:schemeClr val="phClr">
+                <a:satMod val="103000"/>
+                <a:lumMod val="102000"/>
+                <a:tint val="94000"/>
+              </a:schemeClr>
+            </a:gs>
+            <a:gs pos="50000">
+              <a:schemeClr val="phClr">
+                <a:satMod val="110000"/>
+                <a:lumMod val="100000"/>
+                <a:shade val="100000"/>
+              </a:schemeClr>
+            </a:gs>
+            <a:gs pos="100000">
+              <a:schemeClr val="phClr">
+                <a:lumMod val="99000"/>
+                <a:satMod val="120000"/>
+                <a:shade val="78000"/>
+              </a:schemeClr>
+            </a:gs>
+          </a:gsLst>
+          <a:lin ang="5400000" scaled="0"/>
+        </a:gradFill>
+      </a:fillStyleLst>
+      <a:lnStyleLst>
+        <a:ln w="6350" cap="flat" cmpd="sng" algn="ctr">
+          <a:solidFill>
+            <a:schemeClr val="phClr"/>
+          </a:solidFill>
+          <a:prstDash val="solid"/>
+          <a:miter lim="800000"/>
+        </a:ln>
+        <a:ln w="12700" cap="flat" cmpd="sng" algn="ctr">
+          <a:solidFill>
+            <a:schemeClr val="phClr"/>
+          </a:solidFill>
+          <a:prstDash val="solid"/>
+          <a:miter lim="800000"/>
+        </a:ln>
+        <a:ln w="19050" cap="flat" cmpd="sng" algn="ctr">
+          <a:solidFill>
+            <a:schemeClr val="phClr"/>
+          </a:solidFill>
+          <a:prstDash val="solid"/>
+          <a:miter lim="800000"/>
+        </a:ln>
+      </a:lnStyleLst>
+      <a:effectStyleLst>
+        <a:effectStyle>
+          <a:effectLst/>
+        </a:effectStyle>
+        <a:effectStyle>
+          <a:effectLst/>
+        </a:effectStyle>
+        <a:effectStyle>
+          <a:effectLst>
+            <a:outerShdw blurRad="57150" dist="19050" dir="5400000" algn="ctr" rotWithShape="0">
+              <a:srgbClr val="000000">
+                <a:alpha val="63000"/>
+              </a:srgbClr>
+            </a:outerShdw>
+          </a:effectLst>
+        </a:effectStyle>
+      </a:effectStyleLst>
+      <a:bgFillStyleLst>
+        <a:solidFill>
+          <a:schemeClr val="phClr"/>
+        </a:solidFill>
+        <a:solidFill>
+          <a:schemeClr val="phClr">
+            <a:tint val="95000"/>
+            <a:satMod val="170000"/>
+          </a:schemeClr>
+        </a:solidFill>
+        <a:gradFill rotWithShape="1">
+          <a:gsLst>
+            <a:gs pos="0">
+              <a:schemeClr val="phClr">
+                <a:tint val="93000"/>
+                <a:satMod val="150000"/>
+                <a:shade val="98000"/>
+                <a:lumMod val="102000"/>
+              </a:schemeClr>
+            </a:gs>
+            <a:gs pos="50000">
+              <a:schemeClr val="phClr">
+                <a:tint val="98000"/>
+                <a:satMod val="130000"/>
+                <a:shade val="90000"/>
+                <a:lumMod val="103000"/>
+              </a:schemeClr>
+            </a:gs>
+            <a:gs pos="100000">
+              <a:schemeClr val="phClr">
+                <a:shade val="63000"/>
+                <a:satMod val="120000"/>
+              </a:schemeClr>
+            </a:gs>
+          </a:gsLst>
+          <a:lin ang="5400000" scaled="0"/>
+        </a:gradFill>
+      </a:bgFillStyleLst>
+    </a:fmtScheme>
+  </a:themeElements>
+  <a:objectDefaults/>
+  <a:extraClrSchemeLst/>
+  <a:extLst>
+    <a:ext uri="{05A4C25C-085E-4340-85A3-A5531E510DB2}">
+      <thm15:themeFamily xmlns:thm15="http://schemas.microsoft.com/office/thememl/2012/main" name="Office Theme" id="{62F939B6-93AF-4DB8-9C6B-D6C7DFDC589F}" vid="{4A3C46E8-61CC-4603-A589-7422A47A8E4A}"/>
+    </a:ext>
+  </a:extLst>
+</a:theme>
 </file>
</xml_diff>